<commit_message>
documentation | Presentation update
</commit_message>
<xml_diff>
--- a/source/MySEProject/Documentation/ML-22-23-15 Approve Prediction of Multisequence Learning .pptx
+++ b/source/MySEProject/Documentation/ML-22-23-15 Approve Prediction of Multisequence Learning .pptx
@@ -276,7 +276,7 @@
           <a:p>
             <a:fld id="{5E7AA473-D82F-4EFF-9DF7-AE6D83C51288}" type="datetime1">
               <a:rPr lang="en-US" smtClean="0"/>
-              <a:t>3/4/23</a:t>
+              <a:t>3/4/2023</a:t>
             </a:fld>
             <a:endParaRPr lang="en-US"/>
           </a:p>
@@ -344,7 +344,7 @@
                 <a16:creationId xmlns:a16="http://schemas.microsoft.com/office/drawing/2014/main" id="{F3FF94B3-6D3E-44FE-BB02-A9027C0003C7}"/>
               </a:ext>
               <a:ext uri="{C183D7F6-B498-43B3-948B-1728B52AA6E4}">
-                <adec:decorative xmlns:adec="http://schemas.microsoft.com/office/drawing/2017/decorative" val="1"/>
+                <adec:decorative xmlns:adec="http://schemas.microsoft.com/office/drawing/2017/decorative" xmlns="" val="1"/>
               </a:ext>
             </a:extLst>
           </p:cNvPr>
@@ -530,7 +530,7 @@
           <a:p>
             <a:fld id="{1E12F1F0-FE2D-4C1C-B320-8CB9BE735F0F}" type="datetime1">
               <a:rPr lang="en-US" smtClean="0"/>
-              <a:t>3/4/23</a:t>
+              <a:t>3/4/2023</a:t>
             </a:fld>
             <a:endParaRPr lang="en-US"/>
           </a:p>
@@ -628,7 +628,7 @@
                 <a16:creationId xmlns:a16="http://schemas.microsoft.com/office/drawing/2014/main" id="{BD7BD47B-C187-494C-812F-46BE0040B915}"/>
               </a:ext>
               <a:ext uri="{C183D7F6-B498-43B3-948B-1728B52AA6E4}">
-                <adec:decorative xmlns:adec="http://schemas.microsoft.com/office/drawing/2017/decorative" val="1"/>
+                <adec:decorative xmlns:adec="http://schemas.microsoft.com/office/drawing/2017/decorative" xmlns="" val="1"/>
               </a:ext>
             </a:extLst>
           </p:cNvPr>
@@ -798,7 +798,7 @@
           <a:p>
             <a:fld id="{2CF1B96C-10FD-4EBC-9029-9652B7535D02}" type="datetime1">
               <a:rPr lang="en-US" smtClean="0"/>
-              <a:t>3/4/23</a:t>
+              <a:t>3/4/2023</a:t>
             </a:fld>
             <a:endParaRPr lang="en-US"/>
           </a:p>
@@ -866,7 +866,7 @@
                 <a16:creationId xmlns:a16="http://schemas.microsoft.com/office/drawing/2014/main" id="{4618136A-0796-46EB-89BB-4C73C0258FE9}"/>
               </a:ext>
               <a:ext uri="{C183D7F6-B498-43B3-948B-1728B52AA6E4}">
-                <adec:decorative xmlns:adec="http://schemas.microsoft.com/office/drawing/2017/decorative" val="1"/>
+                <adec:decorative xmlns:adec="http://schemas.microsoft.com/office/drawing/2017/decorative" xmlns="" val="1"/>
               </a:ext>
             </a:extLst>
           </p:cNvPr>
@@ -1052,7 +1052,7 @@
           <a:p>
             <a:fld id="{14878474-CC00-4A95-9D50-A41C12D1EEC4}" type="datetime1">
               <a:rPr lang="en-US" smtClean="0"/>
-              <a:t>3/4/23</a:t>
+              <a:t>3/4/2023</a:t>
             </a:fld>
             <a:endParaRPr lang="en-US"/>
           </a:p>
@@ -1330,7 +1330,7 @@
           <a:p>
             <a:fld id="{7F38C8B4-7FBB-408F-BDB9-F0496874AFB2}" type="datetime1">
               <a:rPr lang="en-US" smtClean="0"/>
-              <a:t>3/4/23</a:t>
+              <a:t>3/4/2023</a:t>
             </a:fld>
             <a:endParaRPr lang="en-US"/>
           </a:p>
@@ -1602,7 +1602,7 @@
           <a:p>
             <a:fld id="{2BB8EE20-A5E2-47D3-8F6D-A2BA7AB2E093}" type="datetime1">
               <a:rPr lang="en-US" smtClean="0"/>
-              <a:t>3/4/23</a:t>
+              <a:t>3/4/2023</a:t>
             </a:fld>
             <a:endParaRPr lang="en-US"/>
           </a:p>
@@ -1700,7 +1700,7 @@
                 <a16:creationId xmlns:a16="http://schemas.microsoft.com/office/drawing/2014/main" id="{BF4AA536-072F-4374-926E-17E038EC7E98}"/>
               </a:ext>
               <a:ext uri="{C183D7F6-B498-43B3-948B-1728B52AA6E4}">
-                <adec:decorative xmlns:adec="http://schemas.microsoft.com/office/drawing/2017/decorative" val="1"/>
+                <adec:decorative xmlns:adec="http://schemas.microsoft.com/office/drawing/2017/decorative" xmlns="" val="1"/>
               </a:ext>
             </a:extLst>
           </p:cNvPr>
@@ -2160,7 +2160,7 @@
           <a:p>
             <a:fld id="{3382CF99-132F-413F-B7EF-71A5C33F2ED6}" type="datetime1">
               <a:rPr lang="en-US" smtClean="0"/>
-              <a:t>3/4/23</a:t>
+              <a:t>3/4/2023</a:t>
             </a:fld>
             <a:endParaRPr lang="en-US"/>
           </a:p>
@@ -2302,7 +2302,7 @@
           <a:p>
             <a:fld id="{1F17AE06-98E0-4D9F-A059-92C3548821BB}" type="datetime1">
               <a:rPr lang="en-US" smtClean="0"/>
-              <a:t>3/4/23</a:t>
+              <a:t>3/4/2023</a:t>
             </a:fld>
             <a:endParaRPr lang="en-US"/>
           </a:p>
@@ -2415,7 +2415,7 @@
           <a:p>
             <a:fld id="{FFBA00CA-3DDC-4705-B840-978EF5EA0707}" type="datetime1">
               <a:rPr lang="en-US" smtClean="0"/>
-              <a:t>3/4/23</a:t>
+              <a:t>3/4/2023</a:t>
             </a:fld>
             <a:endParaRPr lang="en-US"/>
           </a:p>
@@ -2734,7 +2734,7 @@
           <a:p>
             <a:fld id="{FC366D49-0BBA-4C5A-AD96-6448CA63451A}" type="datetime1">
               <a:rPr lang="en-US" smtClean="0"/>
-              <a:t>3/4/23</a:t>
+              <a:t>3/4/2023</a:t>
             </a:fld>
             <a:endParaRPr lang="en-US"/>
           </a:p>
@@ -3031,7 +3031,7 @@
           <a:p>
             <a:fld id="{4F4EB293-A316-472D-A8B4-6947CF1A12B7}" type="datetime1">
               <a:rPr lang="en-US" smtClean="0"/>
-              <a:t>3/4/23</a:t>
+              <a:t>3/4/2023</a:t>
             </a:fld>
             <a:endParaRPr lang="en-US"/>
           </a:p>
@@ -3310,7 +3310,7 @@
           <a:p>
             <a:fld id="{734BCCD4-CEB1-405B-A443-DD9CBCBEA552}" type="datetime1">
               <a:rPr lang="en-US" smtClean="0"/>
-              <a:t>3/4/23</a:t>
+              <a:t>3/4/2023</a:t>
             </a:fld>
             <a:endParaRPr lang="en-US"/>
           </a:p>
@@ -3793,7 +3793,7 @@
                 <a16:creationId xmlns:a16="http://schemas.microsoft.com/office/drawing/2014/main" id="{956C5C09-0043-4549-B800-2101B70D667D}"/>
               </a:ext>
               <a:ext uri="{C183D7F6-B498-43B3-948B-1728B52AA6E4}">
-                <adec:decorative xmlns:adec="http://schemas.microsoft.com/office/drawing/2017/decorative" val="1"/>
+                <adec:decorative xmlns:adec="http://schemas.microsoft.com/office/drawing/2017/decorative" xmlns="" val="1"/>
               </a:ext>
             </a:extLst>
           </p:cNvPr>
@@ -3853,7 +3853,7 @@
                 <a16:creationId xmlns:a16="http://schemas.microsoft.com/office/drawing/2014/main" id="{B7E2F724-2FB3-4D1D-A730-739B8654C030}"/>
               </a:ext>
               <a:ext uri="{C183D7F6-B498-43B3-948B-1728B52AA6E4}">
-                <adec:decorative xmlns:adec="http://schemas.microsoft.com/office/drawing/2017/decorative" val="1"/>
+                <adec:decorative xmlns:adec="http://schemas.microsoft.com/office/drawing/2017/decorative" xmlns="" val="1"/>
               </a:ext>
             </a:extLst>
           </p:cNvPr>
@@ -3996,6 +3996,18 @@
               </a:rPr>
               <a:t>Approve Prediction of Multisequence Learning </a:t>
             </a:r>
+            <a:r>
+              <a:rPr lang="en-IN" sz="3800" dirty="0">
+                <a:solidFill>
+                  <a:srgbClr val="FFFFFF"/>
+                </a:solidFill>
+                <a:effectLst/>
+                <a:latin typeface="Segoe UI" panose="020B0502040204020203" pitchFamily="34" charset="0"/>
+                <a:ea typeface="Yu Gothic Light" panose="020B0300000000000000" pitchFamily="34" charset="-128"/>
+                <a:cs typeface="Times New Roman" panose="02020603050405020304" pitchFamily="18" charset="0"/>
+              </a:rPr>
+              <a:t/>
+            </a:r>
             <a:br>
               <a:rPr lang="en-IN" sz="3800" dirty="0">
                 <a:solidFill>
@@ -4132,7 +4144,7 @@
                 <a16:creationId xmlns:a16="http://schemas.microsoft.com/office/drawing/2014/main" id="{B2C335F7-F61C-4EB4-80F2-4B1438FE66BB}"/>
               </a:ext>
               <a:ext uri="{C183D7F6-B498-43B3-948B-1728B52AA6E4}">
-                <adec:decorative xmlns:adec="http://schemas.microsoft.com/office/drawing/2017/decorative" val="1"/>
+                <adec:decorative xmlns:adec="http://schemas.microsoft.com/office/drawing/2017/decorative" xmlns="" val="1"/>
               </a:ext>
             </a:extLst>
           </p:cNvPr>
@@ -4263,7 +4275,7 @@
                 <a16:creationId xmlns:a16="http://schemas.microsoft.com/office/drawing/2014/main" id="{FAA3B297-9683-4E38-89FA-062C53E13F85}"/>
               </a:ext>
               <a:ext uri="{C183D7F6-B498-43B3-948B-1728B52AA6E4}">
-                <adec:decorative xmlns:adec="http://schemas.microsoft.com/office/drawing/2017/decorative" val="1"/>
+                <adec:decorative xmlns:adec="http://schemas.microsoft.com/office/drawing/2017/decorative" xmlns="" val="1"/>
               </a:ext>
             </a:extLst>
           </p:cNvPr>
@@ -4361,7 +4373,7 @@
                 <a16:creationId xmlns:a16="http://schemas.microsoft.com/office/drawing/2014/main" id="{5B8D7907-8AB9-4E98-A576-1A13AECEDF3A}"/>
               </a:ext>
               <a:ext uri="{C183D7F6-B498-43B3-948B-1728B52AA6E4}">
-                <adec:decorative xmlns:adec="http://schemas.microsoft.com/office/drawing/2017/decorative" val="1"/>
+                <adec:decorative xmlns:adec="http://schemas.microsoft.com/office/drawing/2017/decorative" xmlns="" val="1"/>
               </a:ext>
             </a:extLst>
           </p:cNvPr>
@@ -4536,7 +4548,7 @@
                 <a16:creationId xmlns:a16="http://schemas.microsoft.com/office/drawing/2014/main" id="{FAA3B297-9683-4E38-89FA-062C53E13F85}"/>
               </a:ext>
               <a:ext uri="{C183D7F6-B498-43B3-948B-1728B52AA6E4}">
-                <adec:decorative xmlns:adec="http://schemas.microsoft.com/office/drawing/2017/decorative" val="1"/>
+                <adec:decorative xmlns:adec="http://schemas.microsoft.com/office/drawing/2017/decorative" xmlns="" val="1"/>
               </a:ext>
             </a:extLst>
           </p:cNvPr>
@@ -4631,7 +4643,7 @@
                 <a16:creationId xmlns:a16="http://schemas.microsoft.com/office/drawing/2014/main" id="{5B8D7907-8AB9-4E98-A576-1A13AECEDF3A}"/>
               </a:ext>
               <a:ext uri="{C183D7F6-B498-43B3-948B-1728B52AA6E4}">
-                <adec:decorative xmlns:adec="http://schemas.microsoft.com/office/drawing/2017/decorative" val="1"/>
+                <adec:decorative xmlns:adec="http://schemas.microsoft.com/office/drawing/2017/decorative" xmlns="" val="1"/>
               </a:ext>
             </a:extLst>
           </p:cNvPr>
@@ -4836,7 +4848,7 @@
                 <a16:creationId xmlns:a16="http://schemas.microsoft.com/office/drawing/2014/main" id="{FAA3B297-9683-4E38-89FA-062C53E13F85}"/>
               </a:ext>
               <a:ext uri="{C183D7F6-B498-43B3-948B-1728B52AA6E4}">
-                <adec:decorative xmlns:adec="http://schemas.microsoft.com/office/drawing/2017/decorative" val="1"/>
+                <adec:decorative xmlns:adec="http://schemas.microsoft.com/office/drawing/2017/decorative" xmlns="" val="1"/>
               </a:ext>
             </a:extLst>
           </p:cNvPr>
@@ -4931,7 +4943,7 @@
                 <a16:creationId xmlns:a16="http://schemas.microsoft.com/office/drawing/2014/main" id="{5B8D7907-8AB9-4E98-A576-1A13AECEDF3A}"/>
               </a:ext>
               <a:ext uri="{C183D7F6-B498-43B3-948B-1728B52AA6E4}">
-                <adec:decorative xmlns:adec="http://schemas.microsoft.com/office/drawing/2017/decorative" val="1"/>
+                <adec:decorative xmlns:adec="http://schemas.microsoft.com/office/drawing/2017/decorative" xmlns="" val="1"/>
               </a:ext>
             </a:extLst>
           </p:cNvPr>
@@ -5014,7 +5026,123 @@
           </a:bodyPr>
           <a:lstStyle/>
           <a:p>
-            <a:endParaRPr lang="en-US"/>
+            <a:pPr marL="342900" indent="-342900">
+              <a:buFont typeface="Arial" panose="020B0604020202020204" pitchFamily="34" charset="0"/>
+              <a:buChar char="•"/>
+            </a:pPr>
+            <a:r>
+              <a:rPr lang="en-US" dirty="0">
+                <a:latin typeface="Arial" panose="020B0604020202020204" pitchFamily="34" charset="0"/>
+                <a:cs typeface="Arial" panose="020B0604020202020204" pitchFamily="34" charset="0"/>
+              </a:rPr>
+              <a:t>Medical scientists and machine learning engineers were collaborating to better understand the cortex for temporal pattern recognition</a:t>
+            </a:r>
+            <a:r>
+              <a:rPr lang="en-US" dirty="0" smtClean="0">
+                <a:latin typeface="Arial" panose="020B0604020202020204" pitchFamily="34" charset="0"/>
+                <a:cs typeface="Arial" panose="020B0604020202020204" pitchFamily="34" charset="0"/>
+              </a:rPr>
+              <a:t>.</a:t>
+            </a:r>
+          </a:p>
+          <a:p>
+            <a:pPr marL="342900" indent="-342900">
+              <a:buFont typeface="Arial" panose="020B0604020202020204" pitchFamily="34" charset="0"/>
+              <a:buChar char="•"/>
+            </a:pPr>
+            <a:r>
+              <a:rPr lang="en-US" dirty="0" smtClean="0">
+                <a:latin typeface="Arial" panose="020B0604020202020204" pitchFamily="34" charset="0"/>
+                <a:cs typeface="Arial" panose="020B0604020202020204" pitchFamily="34" charset="0"/>
+              </a:rPr>
+              <a:t>For </a:t>
+            </a:r>
+            <a:r>
+              <a:rPr lang="en-US" dirty="0">
+                <a:latin typeface="Arial" panose="020B0604020202020204" pitchFamily="34" charset="0"/>
+                <a:cs typeface="Arial" panose="020B0604020202020204" pitchFamily="34" charset="0"/>
+              </a:rPr>
+              <a:t>sequence learning, HTM (Hierarchical Temporal Memory) has been proposed</a:t>
+            </a:r>
+            <a:r>
+              <a:rPr lang="en-US" dirty="0" smtClean="0">
+                <a:latin typeface="Arial" panose="020B0604020202020204" pitchFamily="34" charset="0"/>
+                <a:cs typeface="Arial" panose="020B0604020202020204" pitchFamily="34" charset="0"/>
+              </a:rPr>
+              <a:t>.</a:t>
+            </a:r>
+          </a:p>
+          <a:p>
+            <a:pPr marL="342900" indent="-342900">
+              <a:buFont typeface="Arial" panose="020B0604020202020204" pitchFamily="34" charset="0"/>
+              <a:buChar char="•"/>
+            </a:pPr>
+            <a:r>
+              <a:rPr lang="en-US" dirty="0" smtClean="0">
+                <a:latin typeface="Arial" panose="020B0604020202020204" pitchFamily="34" charset="0"/>
+                <a:cs typeface="Arial" panose="020B0604020202020204" pitchFamily="34" charset="0"/>
+              </a:rPr>
+              <a:t>HTM </a:t>
+            </a:r>
+            <a:r>
+              <a:rPr lang="en-US" dirty="0">
+                <a:latin typeface="Arial" panose="020B0604020202020204" pitchFamily="34" charset="0"/>
+                <a:cs typeface="Arial" panose="020B0604020202020204" pitchFamily="34" charset="0"/>
+              </a:rPr>
+              <a:t>is a </a:t>
+            </a:r>
+            <a:r>
+              <a:rPr lang="en-US" dirty="0" err="1">
+                <a:latin typeface="Arial" panose="020B0604020202020204" pitchFamily="34" charset="0"/>
+                <a:cs typeface="Arial" panose="020B0604020202020204" pitchFamily="34" charset="0"/>
+              </a:rPr>
+              <a:t>biomimetics</a:t>
+            </a:r>
+            <a:r>
+              <a:rPr lang="en-US" dirty="0">
+                <a:latin typeface="Arial" panose="020B0604020202020204" pitchFamily="34" charset="0"/>
+                <a:cs typeface="Arial" panose="020B0604020202020204" pitchFamily="34" charset="0"/>
+              </a:rPr>
+              <a:t> model based on the memory prediction principle</a:t>
+            </a:r>
+            <a:r>
+              <a:rPr lang="en-US" dirty="0" smtClean="0">
+                <a:latin typeface="Arial" panose="020B0604020202020204" pitchFamily="34" charset="0"/>
+                <a:cs typeface="Arial" panose="020B0604020202020204" pitchFamily="34" charset="0"/>
+              </a:rPr>
+              <a:t>.</a:t>
+            </a:r>
+          </a:p>
+          <a:p>
+            <a:pPr marL="342900" indent="-342900">
+              <a:buFont typeface="Arial" panose="020B0604020202020204" pitchFamily="34" charset="0"/>
+              <a:buChar char="•"/>
+            </a:pPr>
+            <a:r>
+              <a:rPr lang="en-US" dirty="0" err="1" smtClean="0">
+                <a:latin typeface="Arial" panose="020B0604020202020204" pitchFamily="34" charset="0"/>
+                <a:cs typeface="Arial" panose="020B0604020202020204" pitchFamily="34" charset="0"/>
+              </a:rPr>
+              <a:t>Multisequence</a:t>
+            </a:r>
+            <a:r>
+              <a:rPr lang="en-US" dirty="0" smtClean="0">
+                <a:latin typeface="Arial" panose="020B0604020202020204" pitchFamily="34" charset="0"/>
+                <a:cs typeface="Arial" panose="020B0604020202020204" pitchFamily="34" charset="0"/>
+              </a:rPr>
+              <a:t> </a:t>
+            </a:r>
+            <a:r>
+              <a:rPr lang="en-US" dirty="0">
+                <a:latin typeface="Arial" panose="020B0604020202020204" pitchFamily="34" charset="0"/>
+                <a:cs typeface="Arial" panose="020B0604020202020204" pitchFamily="34" charset="0"/>
+              </a:rPr>
+              <a:t>Learning is the process of memorizing multiple sequences.</a:t>
+            </a:r>
+            <a:endParaRPr lang="en-US" dirty="0">
+              <a:latin typeface="Arial" panose="020B0604020202020204" pitchFamily="34" charset="0"/>
+              <a:cs typeface="Arial" panose="020B0604020202020204" pitchFamily="34" charset="0"/>
+            </a:endParaRPr>
           </a:p>
         </p:txBody>
       </p:sp>
@@ -5064,7 +5192,7 @@
                 <a16:creationId xmlns:a16="http://schemas.microsoft.com/office/drawing/2014/main" id="{FAA3B297-9683-4E38-89FA-062C53E13F85}"/>
               </a:ext>
               <a:ext uri="{C183D7F6-B498-43B3-948B-1728B52AA6E4}">
-                <adec:decorative xmlns:adec="http://schemas.microsoft.com/office/drawing/2017/decorative" val="1"/>
+                <adec:decorative xmlns:adec="http://schemas.microsoft.com/office/drawing/2017/decorative" xmlns="" val="1"/>
               </a:ext>
             </a:extLst>
           </p:cNvPr>
@@ -5159,7 +5287,7 @@
                 <a16:creationId xmlns:a16="http://schemas.microsoft.com/office/drawing/2014/main" id="{5B8D7907-8AB9-4E98-A576-1A13AECEDF3A}"/>
               </a:ext>
               <a:ext uri="{C183D7F6-B498-43B3-948B-1728B52AA6E4}">
-                <adec:decorative xmlns:adec="http://schemas.microsoft.com/office/drawing/2017/decorative" val="1"/>
+                <adec:decorative xmlns:adec="http://schemas.microsoft.com/office/drawing/2017/decorative" xmlns="" val="1"/>
               </a:ext>
             </a:extLst>
           </p:cNvPr>
@@ -5292,7 +5420,7 @@
                 <a16:creationId xmlns:a16="http://schemas.microsoft.com/office/drawing/2014/main" id="{FAA3B297-9683-4E38-89FA-062C53E13F85}"/>
               </a:ext>
               <a:ext uri="{C183D7F6-B498-43B3-948B-1728B52AA6E4}">
-                <adec:decorative xmlns:adec="http://schemas.microsoft.com/office/drawing/2017/decorative" val="1"/>
+                <adec:decorative xmlns:adec="http://schemas.microsoft.com/office/drawing/2017/decorative" xmlns="" val="1"/>
               </a:ext>
             </a:extLst>
           </p:cNvPr>
@@ -5394,7 +5522,7 @@
                 <a16:creationId xmlns:a16="http://schemas.microsoft.com/office/drawing/2014/main" id="{5B8D7907-8AB9-4E98-A576-1A13AECEDF3A}"/>
               </a:ext>
               <a:ext uri="{C183D7F6-B498-43B3-948B-1728B52AA6E4}">
-                <adec:decorative xmlns:adec="http://schemas.microsoft.com/office/drawing/2017/decorative" val="1"/>
+                <adec:decorative xmlns:adec="http://schemas.microsoft.com/office/drawing/2017/decorative" xmlns="" val="1"/>
               </a:ext>
             </a:extLst>
           </p:cNvPr>
@@ -5527,7 +5655,7 @@
                 <a16:creationId xmlns:a16="http://schemas.microsoft.com/office/drawing/2014/main" id="{FAA3B297-9683-4E38-89FA-062C53E13F85}"/>
               </a:ext>
               <a:ext uri="{C183D7F6-B498-43B3-948B-1728B52AA6E4}">
-                <adec:decorative xmlns:adec="http://schemas.microsoft.com/office/drawing/2017/decorative" val="1"/>
+                <adec:decorative xmlns:adec="http://schemas.microsoft.com/office/drawing/2017/decorative" xmlns="" val="1"/>
               </a:ext>
             </a:extLst>
           </p:cNvPr>
@@ -5625,7 +5753,7 @@
                 <a16:creationId xmlns:a16="http://schemas.microsoft.com/office/drawing/2014/main" id="{5B8D7907-8AB9-4E98-A576-1A13AECEDF3A}"/>
               </a:ext>
               <a:ext uri="{C183D7F6-B498-43B3-948B-1728B52AA6E4}">
-                <adec:decorative xmlns:adec="http://schemas.microsoft.com/office/drawing/2017/decorative" val="1"/>
+                <adec:decorative xmlns:adec="http://schemas.microsoft.com/office/drawing/2017/decorative" xmlns="" val="1"/>
               </a:ext>
             </a:extLst>
           </p:cNvPr>
@@ -5758,7 +5886,7 @@
                 <a16:creationId xmlns:a16="http://schemas.microsoft.com/office/drawing/2014/main" id="{FAA3B297-9683-4E38-89FA-062C53E13F85}"/>
               </a:ext>
               <a:ext uri="{C183D7F6-B498-43B3-948B-1728B52AA6E4}">
-                <adec:decorative xmlns:adec="http://schemas.microsoft.com/office/drawing/2017/decorative" val="1"/>
+                <adec:decorative xmlns:adec="http://schemas.microsoft.com/office/drawing/2017/decorative" xmlns="" val="1"/>
               </a:ext>
             </a:extLst>
           </p:cNvPr>
@@ -5853,7 +5981,7 @@
                 <a16:creationId xmlns:a16="http://schemas.microsoft.com/office/drawing/2014/main" id="{5B8D7907-8AB9-4E98-A576-1A13AECEDF3A}"/>
               </a:ext>
               <a:ext uri="{C183D7F6-B498-43B3-948B-1728B52AA6E4}">
-                <adec:decorative xmlns:adec="http://schemas.microsoft.com/office/drawing/2017/decorative" val="1"/>
+                <adec:decorative xmlns:adec="http://schemas.microsoft.com/office/drawing/2017/decorative" xmlns="" val="1"/>
               </a:ext>
             </a:extLst>
           </p:cNvPr>
@@ -5986,7 +6114,7 @@
                 <a16:creationId xmlns:a16="http://schemas.microsoft.com/office/drawing/2014/main" id="{FAA3B297-9683-4E38-89FA-062C53E13F85}"/>
               </a:ext>
               <a:ext uri="{C183D7F6-B498-43B3-948B-1728B52AA6E4}">
-                <adec:decorative xmlns:adec="http://schemas.microsoft.com/office/drawing/2017/decorative" val="1"/>
+                <adec:decorative xmlns:adec="http://schemas.microsoft.com/office/drawing/2017/decorative" xmlns="" val="1"/>
               </a:ext>
             </a:extLst>
           </p:cNvPr>
@@ -6081,7 +6209,7 @@
                 <a16:creationId xmlns:a16="http://schemas.microsoft.com/office/drawing/2014/main" id="{5B8D7907-8AB9-4E98-A576-1A13AECEDF3A}"/>
               </a:ext>
               <a:ext uri="{C183D7F6-B498-43B3-948B-1728B52AA6E4}">
-                <adec:decorative xmlns:adec="http://schemas.microsoft.com/office/drawing/2017/decorative" val="1"/>
+                <adec:decorative xmlns:adec="http://schemas.microsoft.com/office/drawing/2017/decorative" xmlns="" val="1"/>
               </a:ext>
             </a:extLst>
           </p:cNvPr>

</xml_diff>

<commit_message>
Added Content in PPT
</commit_message>
<xml_diff>
--- a/source/MySEProject/Documentation/ML-22-23-15 Approve Prediction of Multisequence Learning .pptx
+++ b/source/MySEProject/Documentation/ML-22-23-15 Approve Prediction of Multisequence Learning .pptx
@@ -12,9 +12,10 @@
     <p:sldId id="260" r:id="rId6"/>
     <p:sldId id="265" r:id="rId7"/>
     <p:sldId id="261" r:id="rId8"/>
-    <p:sldId id="262" r:id="rId9"/>
-    <p:sldId id="263" r:id="rId10"/>
-    <p:sldId id="264" r:id="rId11"/>
+    <p:sldId id="266" r:id="rId9"/>
+    <p:sldId id="262" r:id="rId10"/>
+    <p:sldId id="263" r:id="rId11"/>
+    <p:sldId id="264" r:id="rId12"/>
   </p:sldIdLst>
   <p:sldSz cx="12192000" cy="6858000"/>
   <p:notesSz cx="6858000" cy="9144000"/>
@@ -4333,6 +4334,234 @@
           <p:cNvPr id="2" name="Title 1">
             <a:extLst>
               <a:ext uri="{FF2B5EF4-FFF2-40B4-BE49-F238E27FC236}">
+                <a16:creationId xmlns:a16="http://schemas.microsoft.com/office/drawing/2014/main" id="{0C681EFA-DFBD-EA24-AC3F-12C9EBAF7CF8}"/>
+              </a:ext>
+            </a:extLst>
+          </p:cNvPr>
+          <p:cNvSpPr>
+            <a:spLocks noGrp="1"/>
+          </p:cNvSpPr>
+          <p:nvPr>
+            <p:ph type="title"/>
+          </p:nvPr>
+        </p:nvSpPr>
+        <p:spPr>
+          <a:xfrm>
+            <a:off x="517869" y="785813"/>
+            <a:ext cx="8686800" cy="1000125"/>
+          </a:xfrm>
+        </p:spPr>
+        <p:txBody>
+          <a:bodyPr>
+            <a:normAutofit/>
+          </a:bodyPr>
+          <a:lstStyle/>
+          <a:p>
+            <a:r>
+              <a:rPr lang="en-US" dirty="0"/>
+              <a:t>RESULT</a:t>
+            </a:r>
+          </a:p>
+        </p:txBody>
+      </p:sp>
+      <p:sp>
+        <p:nvSpPr>
+          <p:cNvPr id="10" name="Rectangle 9">
+            <a:extLst>
+              <a:ext uri="{FF2B5EF4-FFF2-40B4-BE49-F238E27FC236}">
+                <a16:creationId xmlns:a16="http://schemas.microsoft.com/office/drawing/2014/main" id="{5B8D7907-8AB9-4E98-A576-1A13AECEDF3A}"/>
+              </a:ext>
+              <a:ext uri="{C183D7F6-B498-43B3-948B-1728B52AA6E4}">
+                <adec:decorative xmlns="" xmlns:adec="http://schemas.microsoft.com/office/drawing/2017/decorative" val="1"/>
+              </a:ext>
+            </a:extLst>
+          </p:cNvPr>
+          <p:cNvSpPr>
+            <a:spLocks noGrp="1" noRot="1" noChangeAspect="1" noMove="1" noResize="1" noEditPoints="1" noAdjustHandles="1" noChangeArrowheads="1" noChangeShapeType="1" noTextEdit="1"/>
+          </p:cNvSpPr>
+          <p:nvPr>
+            <p:extLst>
+              <p:ext uri="{386F3935-93C4-4BCD-93E2-E3B085C9AB24}">
+                <p16:designElem xmlns:p16="http://schemas.microsoft.com/office/powerpoint/2015/main" val="1"/>
+              </p:ext>
+            </p:extLst>
+          </p:nvPr>
+        </p:nvSpPr>
+        <p:spPr>
+          <a:xfrm>
+            <a:off x="517869" y="508090"/>
+            <a:ext cx="8732520" cy="149279"/>
+          </a:xfrm>
+          <a:prstGeom prst="rect">
+            <a:avLst/>
+          </a:prstGeom>
+          <a:solidFill>
+            <a:schemeClr val="tx1"/>
+          </a:solidFill>
+          <a:ln>
+            <a:noFill/>
+          </a:ln>
+        </p:spPr>
+        <p:style>
+          <a:lnRef idx="2">
+            <a:schemeClr val="accent1">
+              <a:shade val="50000"/>
+            </a:schemeClr>
+          </a:lnRef>
+          <a:fillRef idx="1">
+            <a:schemeClr val="accent1"/>
+          </a:fillRef>
+          <a:effectRef idx="0">
+            <a:schemeClr val="accent1"/>
+          </a:effectRef>
+          <a:fontRef idx="minor">
+            <a:schemeClr val="lt1"/>
+          </a:fontRef>
+        </p:style>
+        <p:txBody>
+          <a:bodyPr rtlCol="0" anchor="ctr"/>
+          <a:lstStyle/>
+          <a:p>
+            <a:pPr algn="ctr"/>
+            <a:endParaRPr lang="en-US"/>
+          </a:p>
+        </p:txBody>
+      </p:sp>
+      <p:sp>
+        <p:nvSpPr>
+          <p:cNvPr id="3" name="Content Placeholder 2">
+            <a:extLst>
+              <a:ext uri="{FF2B5EF4-FFF2-40B4-BE49-F238E27FC236}">
+                <a16:creationId xmlns:a16="http://schemas.microsoft.com/office/drawing/2014/main" id="{DC9DCE16-5795-F601-83AE-2E602180EE3A}"/>
+              </a:ext>
+            </a:extLst>
+          </p:cNvPr>
+          <p:cNvSpPr>
+            <a:spLocks noGrp="1"/>
+          </p:cNvSpPr>
+          <p:nvPr>
+            <p:ph idx="1"/>
+          </p:nvPr>
+        </p:nvSpPr>
+        <p:spPr>
+          <a:xfrm>
+            <a:off x="517869" y="3172570"/>
+            <a:ext cx="8686799" cy="3016294"/>
+          </a:xfrm>
+        </p:spPr>
+        <p:txBody>
+          <a:bodyPr>
+            <a:normAutofit/>
+          </a:bodyPr>
+          <a:lstStyle/>
+          <a:p>
+            <a:endParaRPr lang="en-US" dirty="0"/>
+          </a:p>
+        </p:txBody>
+      </p:sp>
+    </p:spTree>
+    <p:extLst>
+      <p:ext uri="{BB962C8B-B14F-4D97-AF65-F5344CB8AC3E}">
+        <p14:creationId xmlns:p14="http://schemas.microsoft.com/office/powerpoint/2010/main" val="3402530586"/>
+      </p:ext>
+    </p:extLst>
+  </p:cSld>
+  <p:clrMapOvr>
+    <a:masterClrMapping/>
+  </p:clrMapOvr>
+</p:sld>
+</file>
+
+<file path=ppt/slides/slide11.xml><?xml version="1.0" encoding="utf-8"?>
+<p:sld xmlns:a="http://schemas.openxmlformats.org/drawingml/2006/main" xmlns:r="http://schemas.openxmlformats.org/officeDocument/2006/relationships" xmlns:p="http://schemas.openxmlformats.org/presentationml/2006/main">
+  <p:cSld>
+    <p:bg>
+      <p:bgPr>
+        <a:solidFill>
+          <a:schemeClr val="bg1"/>
+        </a:solidFill>
+        <a:effectLst/>
+      </p:bgPr>
+    </p:bg>
+    <p:spTree>
+      <p:nvGrpSpPr>
+        <p:cNvPr id="1" name=""/>
+        <p:cNvGrpSpPr/>
+        <p:nvPr/>
+      </p:nvGrpSpPr>
+      <p:grpSpPr>
+        <a:xfrm>
+          <a:off x="0" y="0"/>
+          <a:ext cx="0" cy="0"/>
+          <a:chOff x="0" y="0"/>
+          <a:chExt cx="0" cy="0"/>
+        </a:xfrm>
+      </p:grpSpPr>
+      <p:sp useBgFill="1">
+        <p:nvSpPr>
+          <p:cNvPr id="8" name="Rectangle 7">
+            <a:extLst>
+              <a:ext uri="{FF2B5EF4-FFF2-40B4-BE49-F238E27FC236}">
+                <a16:creationId xmlns:a16="http://schemas.microsoft.com/office/drawing/2014/main" id="{FAA3B297-9683-4E38-89FA-062C53E13F85}"/>
+              </a:ext>
+              <a:ext uri="{C183D7F6-B498-43B3-948B-1728B52AA6E4}">
+                <adec:decorative xmlns="" xmlns:adec="http://schemas.microsoft.com/office/drawing/2017/decorative" val="1"/>
+              </a:ext>
+            </a:extLst>
+          </p:cNvPr>
+          <p:cNvSpPr>
+            <a:spLocks noGrp="1" noRot="1" noChangeAspect="1" noMove="1" noResize="1" noEditPoints="1" noAdjustHandles="1" noChangeArrowheads="1" noChangeShapeType="1" noTextEdit="1"/>
+          </p:cNvSpPr>
+          <p:nvPr>
+            <p:extLst>
+              <p:ext uri="{386F3935-93C4-4BCD-93E2-E3B085C9AB24}">
+                <p16:designElem xmlns:p16="http://schemas.microsoft.com/office/powerpoint/2015/main" val="1"/>
+              </p:ext>
+            </p:extLst>
+          </p:nvPr>
+        </p:nvSpPr>
+        <p:spPr>
+          <a:xfrm>
+            <a:off x="0" y="0"/>
+            <a:ext cx="12188952" cy="6857995"/>
+          </a:xfrm>
+          <a:prstGeom prst="rect">
+            <a:avLst/>
+          </a:prstGeom>
+          <a:ln>
+            <a:noFill/>
+          </a:ln>
+        </p:spPr>
+        <p:style>
+          <a:lnRef idx="2">
+            <a:schemeClr val="accent1">
+              <a:shade val="50000"/>
+            </a:schemeClr>
+          </a:lnRef>
+          <a:fillRef idx="1">
+            <a:schemeClr val="accent1"/>
+          </a:fillRef>
+          <a:effectRef idx="0">
+            <a:schemeClr val="accent1"/>
+          </a:effectRef>
+          <a:fontRef idx="minor">
+            <a:schemeClr val="lt1"/>
+          </a:fontRef>
+        </p:style>
+        <p:txBody>
+          <a:bodyPr rtlCol="0" anchor="ctr"/>
+          <a:lstStyle/>
+          <a:p>
+            <a:pPr algn="ctr"/>
+            <a:endParaRPr lang="en-US" dirty="0"/>
+          </a:p>
+        </p:txBody>
+      </p:sp>
+      <p:sp>
+        <p:nvSpPr>
+          <p:cNvPr id="2" name="Title 1">
+            <a:extLst>
+              <a:ext uri="{FF2B5EF4-FFF2-40B4-BE49-F238E27FC236}">
                 <a16:creationId xmlns:a16="http://schemas.microsoft.com/office/drawing/2014/main" id="{D73406E1-F2BE-59D9-A9F1-8140C3C0F06B}"/>
               </a:ext>
             </a:extLst>
@@ -5041,6 +5270,13 @@
   <p:clrMapOvr>
     <a:masterClrMapping/>
   </p:clrMapOvr>
+  <p:timing>
+    <p:tnLst>
+      <p:par>
+        <p:cTn id="1" dur="indefinite" restart="never" nodeType="tmRoot"/>
+      </p:par>
+    </p:tnLst>
+  </p:timing>
 </p:sld>
 </file>
 
@@ -5381,6 +5617,13 @@
   <p:clrMapOvr>
     <a:masterClrMapping/>
   </p:clrMapOvr>
+  <p:timing>
+    <p:tnLst>
+      <p:par>
+        <p:cTn id="1" dur="indefinite" restart="never" nodeType="tmRoot"/>
+      </p:par>
+    </p:tnLst>
+  </p:timing>
 </p:sld>
 </file>
 
@@ -5609,6 +5852,13 @@
   <p:clrMapOvr>
     <a:masterClrMapping/>
   </p:clrMapOvr>
+  <p:timing>
+    <p:tnLst>
+      <p:par>
+        <p:cTn id="1" dur="indefinite" restart="never" nodeType="tmRoot"/>
+      </p:par>
+    </p:tnLst>
+  </p:timing>
 </p:sld>
 </file>
 
@@ -6115,20 +6365,19 @@
   <p:clrMapOvr>
     <a:masterClrMapping/>
   </p:clrMapOvr>
+  <p:timing>
+    <p:tnLst>
+      <p:par>
+        <p:cTn id="1" dur="indefinite" restart="never" nodeType="tmRoot"/>
+      </p:par>
+    </p:tnLst>
+  </p:timing>
 </p:sld>
 </file>
 
 <file path=ppt/slides/slide8.xml><?xml version="1.0" encoding="utf-8"?>
 <p:sld xmlns:a="http://schemas.openxmlformats.org/drawingml/2006/main" xmlns:r="http://schemas.openxmlformats.org/officeDocument/2006/relationships" xmlns:p="http://schemas.openxmlformats.org/presentationml/2006/main">
   <p:cSld>
-    <p:bg>
-      <p:bgPr>
-        <a:solidFill>
-          <a:schemeClr val="bg1"/>
-        </a:solidFill>
-        <a:effectLst/>
-      </p:bgPr>
-    </p:bg>
     <p:spTree>
       <p:nvGrpSpPr>
         <p:cNvPr id="1" name=""/>
@@ -6143,75 +6392,9 @@
           <a:chExt cx="0" cy="0"/>
         </a:xfrm>
       </p:grpSpPr>
-      <p:sp useBgFill="1">
-        <p:nvSpPr>
-          <p:cNvPr id="8" name="Rectangle 7">
-            <a:extLst>
-              <a:ext uri="{FF2B5EF4-FFF2-40B4-BE49-F238E27FC236}">
-                <a16:creationId xmlns:a16="http://schemas.microsoft.com/office/drawing/2014/main" id="{FAA3B297-9683-4E38-89FA-062C53E13F85}"/>
-              </a:ext>
-              <a:ext uri="{C183D7F6-B498-43B3-948B-1728B52AA6E4}">
-                <adec:decorative xmlns="" xmlns:adec="http://schemas.microsoft.com/office/drawing/2017/decorative" val="1"/>
-              </a:ext>
-            </a:extLst>
-          </p:cNvPr>
-          <p:cNvSpPr>
-            <a:spLocks noGrp="1" noRot="1" noChangeAspect="1" noMove="1" noResize="1" noEditPoints="1" noAdjustHandles="1" noChangeArrowheads="1" noChangeShapeType="1" noTextEdit="1"/>
-          </p:cNvSpPr>
-          <p:nvPr>
-            <p:extLst>
-              <p:ext uri="{386F3935-93C4-4BCD-93E2-E3B085C9AB24}">
-                <p16:designElem xmlns:p16="http://schemas.microsoft.com/office/powerpoint/2015/main" val="1"/>
-              </p:ext>
-            </p:extLst>
-          </p:nvPr>
-        </p:nvSpPr>
-        <p:spPr>
-          <a:xfrm>
-            <a:off x="0" y="0"/>
-            <a:ext cx="12188952" cy="6857995"/>
-          </a:xfrm>
-          <a:prstGeom prst="rect">
-            <a:avLst/>
-          </a:prstGeom>
-          <a:ln>
-            <a:noFill/>
-          </a:ln>
-        </p:spPr>
-        <p:style>
-          <a:lnRef idx="2">
-            <a:schemeClr val="accent1">
-              <a:shade val="50000"/>
-            </a:schemeClr>
-          </a:lnRef>
-          <a:fillRef idx="1">
-            <a:schemeClr val="accent1"/>
-          </a:fillRef>
-          <a:effectRef idx="0">
-            <a:schemeClr val="accent1"/>
-          </a:effectRef>
-          <a:fontRef idx="minor">
-            <a:schemeClr val="lt1"/>
-          </a:fontRef>
-        </p:style>
-        <p:txBody>
-          <a:bodyPr rtlCol="0" anchor="ctr"/>
-          <a:lstStyle/>
-          <a:p>
-            <a:pPr algn="ctr"/>
-            <a:endParaRPr lang="en-US" dirty="0"/>
-          </a:p>
-        </p:txBody>
-      </p:sp>
-      <p:sp>
-        <p:nvSpPr>
-          <p:cNvPr id="2" name="Title 1">
-            <a:extLst>
-              <a:ext uri="{FF2B5EF4-FFF2-40B4-BE49-F238E27FC236}">
-                <a16:creationId xmlns:a16="http://schemas.microsoft.com/office/drawing/2014/main" id="{5F104249-400B-AD3A-F382-C91918689B2C}"/>
-              </a:ext>
-            </a:extLst>
-          </p:cNvPr>
+      <p:sp>
+        <p:nvSpPr>
+          <p:cNvPr id="2" name="Title 1"/>
           <p:cNvSpPr>
             <a:spLocks noGrp="1"/>
           </p:cNvSpPr>
@@ -6221,8 +6404,8 @@
         </p:nvSpPr>
         <p:spPr>
           <a:xfrm>
-            <a:off x="517869" y="976160"/>
-            <a:ext cx="8686800" cy="951494"/>
+            <a:off x="517869" y="978408"/>
+            <a:ext cx="6480089" cy="775747"/>
           </a:xfrm>
         </p:spPr>
         <p:txBody>
@@ -6232,87 +6415,19 @@
           <a:lstStyle/>
           <a:p>
             <a:r>
-              <a:rPr lang="en-US" sz="4000" dirty="0">
+              <a:rPr lang="en-IN" sz="4000" dirty="0">
                 <a:latin typeface="Arial" panose="020B0604020202020204" pitchFamily="34" charset="0"/>
                 <a:cs typeface="Arial" panose="020B0604020202020204" pitchFamily="34" charset="0"/>
               </a:rPr>
-              <a:t>FLOW-CHART</a:t>
-            </a:r>
-          </a:p>
-        </p:txBody>
-      </p:sp>
-      <p:sp>
-        <p:nvSpPr>
-          <p:cNvPr id="10" name="Rectangle 9">
-            <a:extLst>
-              <a:ext uri="{FF2B5EF4-FFF2-40B4-BE49-F238E27FC236}">
-                <a16:creationId xmlns:a16="http://schemas.microsoft.com/office/drawing/2014/main" id="{5B8D7907-8AB9-4E98-A576-1A13AECEDF3A}"/>
-              </a:ext>
-              <a:ext uri="{C183D7F6-B498-43B3-948B-1728B52AA6E4}">
-                <adec:decorative xmlns="" xmlns:adec="http://schemas.microsoft.com/office/drawing/2017/decorative" val="1"/>
-              </a:ext>
-            </a:extLst>
-          </p:cNvPr>
-          <p:cNvSpPr>
-            <a:spLocks noGrp="1" noRot="1" noChangeAspect="1" noMove="1" noResize="1" noEditPoints="1" noAdjustHandles="1" noChangeArrowheads="1" noChangeShapeType="1" noTextEdit="1"/>
-          </p:cNvSpPr>
-          <p:nvPr>
-            <p:extLst>
-              <p:ext uri="{386F3935-93C4-4BCD-93E2-E3B085C9AB24}">
-                <p16:designElem xmlns:p16="http://schemas.microsoft.com/office/powerpoint/2015/main" val="1"/>
-              </p:ext>
-            </p:extLst>
-          </p:nvPr>
-        </p:nvSpPr>
-        <p:spPr>
-          <a:xfrm>
-            <a:off x="517869" y="508090"/>
-            <a:ext cx="8732520" cy="149279"/>
-          </a:xfrm>
-          <a:prstGeom prst="rect">
-            <a:avLst/>
-          </a:prstGeom>
-          <a:solidFill>
-            <a:schemeClr val="tx1"/>
-          </a:solidFill>
-          <a:ln>
-            <a:noFill/>
-          </a:ln>
-        </p:spPr>
-        <p:style>
-          <a:lnRef idx="2">
-            <a:schemeClr val="accent1">
-              <a:shade val="50000"/>
-            </a:schemeClr>
-          </a:lnRef>
-          <a:fillRef idx="1">
-            <a:schemeClr val="accent1"/>
-          </a:fillRef>
-          <a:effectRef idx="0">
-            <a:schemeClr val="accent1"/>
-          </a:effectRef>
-          <a:fontRef idx="minor">
-            <a:schemeClr val="lt1"/>
-          </a:fontRef>
-        </p:style>
-        <p:txBody>
-          <a:bodyPr rtlCol="0" anchor="ctr"/>
-          <a:lstStyle/>
-          <a:p>
-            <a:pPr algn="ctr"/>
-            <a:endParaRPr lang="en-US"/>
-          </a:p>
-        </p:txBody>
-      </p:sp>
-      <p:sp>
-        <p:nvSpPr>
-          <p:cNvPr id="3" name="Content Placeholder 2">
-            <a:extLst>
-              <a:ext uri="{FF2B5EF4-FFF2-40B4-BE49-F238E27FC236}">
-                <a16:creationId xmlns:a16="http://schemas.microsoft.com/office/drawing/2014/main" id="{7F00A25F-4CA4-D443-D525-EEE4B67C7EC0}"/>
-              </a:ext>
-            </a:extLst>
-          </p:cNvPr>
+              <a:t>IMPLEMENTATION</a:t>
+            </a:r>
+            <a:endParaRPr lang="en-IN" sz="4000" dirty="0"/>
+          </a:p>
+        </p:txBody>
+      </p:sp>
+      <p:sp>
+        <p:nvSpPr>
+          <p:cNvPr id="3" name="Content Placeholder 2"/>
           <p:cNvSpPr>
             <a:spLocks noGrp="1"/>
           </p:cNvSpPr>
@@ -6322,30 +6437,106 @@
         </p:nvSpPr>
         <p:spPr>
           <a:xfrm>
-            <a:off x="517869" y="3172570"/>
-            <a:ext cx="8686799" cy="3016294"/>
-          </a:xfrm>
-        </p:spPr>
-        <p:txBody>
-          <a:bodyPr>
-            <a:normAutofit/>
-          </a:bodyPr>
-          <a:lstStyle/>
-          <a:p>
-            <a:endParaRPr lang="en-US" dirty="0"/>
+            <a:off x="517869" y="1799502"/>
+            <a:ext cx="5021182" cy="4870457"/>
+          </a:xfrm>
+        </p:spPr>
+        <p:txBody>
+          <a:bodyPr/>
+          <a:lstStyle/>
+          <a:p>
+            <a:r>
+              <a:rPr lang="en-US" b="1" dirty="0">
+                <a:latin typeface="Arial" panose="020B0604020202020204" pitchFamily="34" charset="0"/>
+                <a:ea typeface="Black Han Sans" panose="020B0604020202020204" charset="-127"/>
+                <a:cs typeface="Arial" panose="020B0604020202020204" pitchFamily="34" charset="0"/>
+              </a:rPr>
+              <a:t>For Image</a:t>
+            </a:r>
+          </a:p>
+          <a:p>
+            <a:endParaRPr lang="en-US" dirty="0">
+              <a:latin typeface="Arial" panose="020B0604020202020204" pitchFamily="34" charset="0"/>
+              <a:ea typeface="Black Han Sans" panose="020B0604020202020204" charset="-127"/>
+              <a:cs typeface="Arial" panose="020B0604020202020204" pitchFamily="34" charset="0"/>
+            </a:endParaRPr>
+          </a:p>
+          <a:p>
+            <a:r>
+              <a:rPr lang="en-US" dirty="0">
+                <a:latin typeface="Arial" panose="020B0604020202020204" pitchFamily="34" charset="0"/>
+                <a:cs typeface="Arial" panose="020B0604020202020204" pitchFamily="34" charset="0"/>
+              </a:rPr>
+              <a:t>The datasets are downloaded as.jpg files and </a:t>
+            </a:r>
+            <a:r>
+              <a:rPr lang="en-US" dirty="0" err="1">
+                <a:latin typeface="Arial" panose="020B0604020202020204" pitchFamily="34" charset="0"/>
+                <a:cs typeface="Arial" panose="020B0604020202020204" pitchFamily="34" charset="0"/>
+              </a:rPr>
+              <a:t>binarized</a:t>
+            </a:r>
+            <a:r>
+              <a:rPr lang="en-US" dirty="0">
+                <a:latin typeface="Arial" panose="020B0604020202020204" pitchFamily="34" charset="0"/>
+                <a:cs typeface="Arial" panose="020B0604020202020204" pitchFamily="34" charset="0"/>
+              </a:rPr>
+              <a:t> using an encoder with a homeostatic plasticity controller for stability</a:t>
+            </a:r>
+            <a:r>
+              <a:rPr lang="en-US" dirty="0" smtClean="0">
+                <a:latin typeface="Arial" panose="020B0604020202020204" pitchFamily="34" charset="0"/>
+                <a:cs typeface="Arial" panose="020B0604020202020204" pitchFamily="34" charset="0"/>
+              </a:rPr>
+              <a:t>.</a:t>
+            </a:r>
+          </a:p>
+          <a:p>
+            <a:r>
+              <a:rPr lang="en-US" dirty="0" smtClean="0">
+                <a:latin typeface="Arial" panose="020B0604020202020204" pitchFamily="34" charset="0"/>
+                <a:cs typeface="Arial" panose="020B0604020202020204" pitchFamily="34" charset="0"/>
+              </a:rPr>
+              <a:t>The </a:t>
+            </a:r>
+            <a:r>
+              <a:rPr lang="en-US" dirty="0" err="1">
+                <a:latin typeface="Arial" panose="020B0604020202020204" pitchFamily="34" charset="0"/>
+                <a:cs typeface="Arial" panose="020B0604020202020204" pitchFamily="34" charset="0"/>
+              </a:rPr>
+              <a:t>binarized</a:t>
+            </a:r>
+            <a:r>
+              <a:rPr lang="en-US" dirty="0">
+                <a:latin typeface="Arial" panose="020B0604020202020204" pitchFamily="34" charset="0"/>
+                <a:cs typeface="Arial" panose="020B0604020202020204" pitchFamily="34" charset="0"/>
+              </a:rPr>
+              <a:t> datasets are used to train Spatial Pooler via numerous rounds until it reaches a stable state.</a:t>
+            </a:r>
+            <a:endParaRPr lang="en-IN" dirty="0">
+              <a:latin typeface="Arial" panose="020B0604020202020204" pitchFamily="34" charset="0"/>
+              <a:cs typeface="Arial" panose="020B0604020202020204" pitchFamily="34" charset="0"/>
+            </a:endParaRPr>
           </a:p>
         </p:txBody>
       </p:sp>
     </p:spTree>
     <p:extLst>
       <p:ext uri="{BB962C8B-B14F-4D97-AF65-F5344CB8AC3E}">
-        <p14:creationId xmlns:p14="http://schemas.microsoft.com/office/powerpoint/2010/main" val="2487824199"/>
+        <p14:creationId xmlns:p14="http://schemas.microsoft.com/office/powerpoint/2010/main" val="1471242726"/>
       </p:ext>
     </p:extLst>
   </p:cSld>
   <p:clrMapOvr>
     <a:masterClrMapping/>
   </p:clrMapOvr>
+  <p:timing>
+    <p:tnLst>
+      <p:par>
+        <p:cTn id="1" dur="indefinite" restart="never" nodeType="tmRoot"/>
+      </p:par>
+    </p:tnLst>
+  </p:timing>
 </p:sld>
 </file>
 
@@ -6439,7 +6630,7 @@
           <p:cNvPr id="2" name="Title 1">
             <a:extLst>
               <a:ext uri="{FF2B5EF4-FFF2-40B4-BE49-F238E27FC236}">
-                <a16:creationId xmlns:a16="http://schemas.microsoft.com/office/drawing/2014/main" id="{0C681EFA-DFBD-EA24-AC3F-12C9EBAF7CF8}"/>
+                <a16:creationId xmlns:a16="http://schemas.microsoft.com/office/drawing/2014/main" id="{5F104249-400B-AD3A-F382-C91918689B2C}"/>
               </a:ext>
             </a:extLst>
           </p:cNvPr>
@@ -6452,8 +6643,8 @@
         </p:nvSpPr>
         <p:spPr>
           <a:xfrm>
-            <a:off x="517869" y="785813"/>
-            <a:ext cx="8686800" cy="1000125"/>
+            <a:off x="517869" y="976160"/>
+            <a:ext cx="8686800" cy="951494"/>
           </a:xfrm>
         </p:spPr>
         <p:txBody>
@@ -6463,8 +6654,11 @@
           <a:lstStyle/>
           <a:p>
             <a:r>
-              <a:rPr lang="en-US" dirty="0"/>
-              <a:t>RESULT</a:t>
+              <a:rPr lang="en-US" sz="4000" dirty="0">
+                <a:latin typeface="Arial" panose="020B0604020202020204" pitchFamily="34" charset="0"/>
+                <a:cs typeface="Arial" panose="020B0604020202020204" pitchFamily="34" charset="0"/>
+              </a:rPr>
+              <a:t>FLOW-CHART</a:t>
             </a:r>
           </a:p>
         </p:txBody>
@@ -6537,7 +6731,7 @@
           <p:cNvPr id="3" name="Content Placeholder 2">
             <a:extLst>
               <a:ext uri="{FF2B5EF4-FFF2-40B4-BE49-F238E27FC236}">
-                <a16:creationId xmlns:a16="http://schemas.microsoft.com/office/drawing/2014/main" id="{DC9DCE16-5795-F601-83AE-2E602180EE3A}"/>
+                <a16:creationId xmlns:a16="http://schemas.microsoft.com/office/drawing/2014/main" id="{7F00A25F-4CA4-D443-D525-EEE4B67C7EC0}"/>
               </a:ext>
             </a:extLst>
           </p:cNvPr>
@@ -6550,7 +6744,7 @@
         </p:nvSpPr>
         <p:spPr>
           <a:xfrm>
-            <a:off x="517869" y="3172570"/>
+            <a:off x="563590" y="2511773"/>
             <a:ext cx="8686799" cy="3016294"/>
           </a:xfrm>
         </p:spPr>
@@ -6564,16 +6758,107 @@
           </a:p>
         </p:txBody>
       </p:sp>
+      <p:sp>
+        <p:nvSpPr>
+          <p:cNvPr id="4" name="Oval 3"/>
+          <p:cNvSpPr/>
+          <p:nvPr/>
+        </p:nvSpPr>
+        <p:spPr>
+          <a:xfrm>
+            <a:off x="1483567" y="3051110"/>
+            <a:ext cx="1082351" cy="615821"/>
+          </a:xfrm>
+          <a:prstGeom prst="ellipse">
+            <a:avLst/>
+          </a:prstGeom>
+        </p:spPr>
+        <p:style>
+          <a:lnRef idx="2">
+            <a:schemeClr val="accent1">
+              <a:shade val="50000"/>
+            </a:schemeClr>
+          </a:lnRef>
+          <a:fillRef idx="1">
+            <a:schemeClr val="accent1"/>
+          </a:fillRef>
+          <a:effectRef idx="0">
+            <a:schemeClr val="accent1"/>
+          </a:effectRef>
+          <a:fontRef idx="minor">
+            <a:schemeClr val="lt1"/>
+          </a:fontRef>
+        </p:style>
+        <p:txBody>
+          <a:bodyPr rtlCol="0" anchor="ctr"/>
+          <a:lstStyle/>
+          <a:p>
+            <a:pPr algn="ctr"/>
+            <a:endParaRPr lang="en-IN">
+              <a:solidFill>
+                <a:schemeClr val="bg1"/>
+              </a:solidFill>
+            </a:endParaRPr>
+          </a:p>
+        </p:txBody>
+      </p:sp>
+      <p:sp>
+        <p:nvSpPr>
+          <p:cNvPr id="5" name="Flowchart: Data 4"/>
+          <p:cNvSpPr/>
+          <p:nvPr/>
+        </p:nvSpPr>
+        <p:spPr>
+          <a:xfrm>
+            <a:off x="1483567" y="4254759"/>
+            <a:ext cx="1054360" cy="612648"/>
+          </a:xfrm>
+          <a:prstGeom prst="flowChartInputOutput">
+            <a:avLst/>
+          </a:prstGeom>
+        </p:spPr>
+        <p:style>
+          <a:lnRef idx="2">
+            <a:schemeClr val="accent1">
+              <a:shade val="50000"/>
+            </a:schemeClr>
+          </a:lnRef>
+          <a:fillRef idx="1">
+            <a:schemeClr val="accent1"/>
+          </a:fillRef>
+          <a:effectRef idx="0">
+            <a:schemeClr val="accent1"/>
+          </a:effectRef>
+          <a:fontRef idx="minor">
+            <a:schemeClr val="lt1"/>
+          </a:fontRef>
+        </p:style>
+        <p:txBody>
+          <a:bodyPr rtlCol="0" anchor="ctr"/>
+          <a:lstStyle/>
+          <a:p>
+            <a:pPr algn="ctr"/>
+            <a:endParaRPr lang="en-IN"/>
+          </a:p>
+        </p:txBody>
+      </p:sp>
     </p:spTree>
     <p:extLst>
       <p:ext uri="{BB962C8B-B14F-4D97-AF65-F5344CB8AC3E}">
-        <p14:creationId xmlns:p14="http://schemas.microsoft.com/office/powerpoint/2010/main" val="3402530586"/>
+        <p14:creationId xmlns:p14="http://schemas.microsoft.com/office/powerpoint/2010/main" val="2487824199"/>
       </p:ext>
     </p:extLst>
   </p:cSld>
   <p:clrMapOvr>
     <a:masterClrMapping/>
   </p:clrMapOvr>
+  <p:timing>
+    <p:tnLst>
+      <p:par>
+        <p:cTn id="1" dur="indefinite" restart="never" nodeType="tmRoot"/>
+      </p:par>
+    </p:tnLst>
+  </p:timing>
 </p:sld>
 </file>
 

</xml_diff>

<commit_message>
Modified Power Point Presentation
</commit_message>
<xml_diff>
--- a/source/MySEProject/Documentation/ML-22-23-15 Approve Prediction of Multisequence Learning .pptx
+++ b/source/MySEProject/Documentation/ML-22-23-15 Approve Prediction of Multisequence Learning .pptx
@@ -278,7 +278,7 @@
           <a:p>
             <a:fld id="{5E7AA473-D82F-4EFF-9DF7-AE6D83C51288}" type="datetime1">
               <a:rPr lang="en-US" smtClean="0"/>
-              <a:t>3/5/2023</a:t>
+              <a:t>3/19/2023</a:t>
             </a:fld>
             <a:endParaRPr lang="en-US"/>
           </a:p>
@@ -346,7 +346,7 @@
                 <a16:creationId xmlns:a16="http://schemas.microsoft.com/office/drawing/2014/main" id="{F3FF94B3-6D3E-44FE-BB02-A9027C0003C7}"/>
               </a:ext>
               <a:ext uri="{C183D7F6-B498-43B3-948B-1728B52AA6E4}">
-                <adec:decorative xmlns="" xmlns:adec="http://schemas.microsoft.com/office/drawing/2017/decorative" val="1"/>
+                <adec:decorative xmlns:adec="http://schemas.microsoft.com/office/drawing/2017/decorative" xmlns="" val="1"/>
               </a:ext>
             </a:extLst>
           </p:cNvPr>
@@ -532,7 +532,7 @@
           <a:p>
             <a:fld id="{1E12F1F0-FE2D-4C1C-B320-8CB9BE735F0F}" type="datetime1">
               <a:rPr lang="en-US" smtClean="0"/>
-              <a:t>3/5/2023</a:t>
+              <a:t>3/19/2023</a:t>
             </a:fld>
             <a:endParaRPr lang="en-US"/>
           </a:p>
@@ -630,7 +630,7 @@
                 <a16:creationId xmlns:a16="http://schemas.microsoft.com/office/drawing/2014/main" id="{BD7BD47B-C187-494C-812F-46BE0040B915}"/>
               </a:ext>
               <a:ext uri="{C183D7F6-B498-43B3-948B-1728B52AA6E4}">
-                <adec:decorative xmlns="" xmlns:adec="http://schemas.microsoft.com/office/drawing/2017/decorative" val="1"/>
+                <adec:decorative xmlns:adec="http://schemas.microsoft.com/office/drawing/2017/decorative" xmlns="" val="1"/>
               </a:ext>
             </a:extLst>
           </p:cNvPr>
@@ -800,7 +800,7 @@
           <a:p>
             <a:fld id="{2CF1B96C-10FD-4EBC-9029-9652B7535D02}" type="datetime1">
               <a:rPr lang="en-US" smtClean="0"/>
-              <a:t>3/5/2023</a:t>
+              <a:t>3/19/2023</a:t>
             </a:fld>
             <a:endParaRPr lang="en-US"/>
           </a:p>
@@ -868,7 +868,7 @@
                 <a16:creationId xmlns:a16="http://schemas.microsoft.com/office/drawing/2014/main" id="{4618136A-0796-46EB-89BB-4C73C0258FE9}"/>
               </a:ext>
               <a:ext uri="{C183D7F6-B498-43B3-948B-1728B52AA6E4}">
-                <adec:decorative xmlns="" xmlns:adec="http://schemas.microsoft.com/office/drawing/2017/decorative" val="1"/>
+                <adec:decorative xmlns:adec="http://schemas.microsoft.com/office/drawing/2017/decorative" xmlns="" val="1"/>
               </a:ext>
             </a:extLst>
           </p:cNvPr>
@@ -1054,7 +1054,7 @@
           <a:p>
             <a:fld id="{14878474-CC00-4A95-9D50-A41C12D1EEC4}" type="datetime1">
               <a:rPr lang="en-US" smtClean="0"/>
-              <a:t>3/5/2023</a:t>
+              <a:t>3/19/2023</a:t>
             </a:fld>
             <a:endParaRPr lang="en-US"/>
           </a:p>
@@ -1332,7 +1332,7 @@
           <a:p>
             <a:fld id="{7F38C8B4-7FBB-408F-BDB9-F0496874AFB2}" type="datetime1">
               <a:rPr lang="en-US" smtClean="0"/>
-              <a:t>3/5/2023</a:t>
+              <a:t>3/19/2023</a:t>
             </a:fld>
             <a:endParaRPr lang="en-US"/>
           </a:p>
@@ -1604,7 +1604,7 @@
           <a:p>
             <a:fld id="{2BB8EE20-A5E2-47D3-8F6D-A2BA7AB2E093}" type="datetime1">
               <a:rPr lang="en-US" smtClean="0"/>
-              <a:t>3/5/2023</a:t>
+              <a:t>3/19/2023</a:t>
             </a:fld>
             <a:endParaRPr lang="en-US"/>
           </a:p>
@@ -1702,7 +1702,7 @@
                 <a16:creationId xmlns:a16="http://schemas.microsoft.com/office/drawing/2014/main" id="{BF4AA536-072F-4374-926E-17E038EC7E98}"/>
               </a:ext>
               <a:ext uri="{C183D7F6-B498-43B3-948B-1728B52AA6E4}">
-                <adec:decorative xmlns="" xmlns:adec="http://schemas.microsoft.com/office/drawing/2017/decorative" val="1"/>
+                <adec:decorative xmlns:adec="http://schemas.microsoft.com/office/drawing/2017/decorative" xmlns="" val="1"/>
               </a:ext>
             </a:extLst>
           </p:cNvPr>
@@ -2162,7 +2162,7 @@
           <a:p>
             <a:fld id="{3382CF99-132F-413F-B7EF-71A5C33F2ED6}" type="datetime1">
               <a:rPr lang="en-US" smtClean="0"/>
-              <a:t>3/5/2023</a:t>
+              <a:t>3/19/2023</a:t>
             </a:fld>
             <a:endParaRPr lang="en-US"/>
           </a:p>
@@ -2304,7 +2304,7 @@
           <a:p>
             <a:fld id="{1F17AE06-98E0-4D9F-A059-92C3548821BB}" type="datetime1">
               <a:rPr lang="en-US" smtClean="0"/>
-              <a:t>3/5/2023</a:t>
+              <a:t>3/19/2023</a:t>
             </a:fld>
             <a:endParaRPr lang="en-US"/>
           </a:p>
@@ -2417,7 +2417,7 @@
           <a:p>
             <a:fld id="{FFBA00CA-3DDC-4705-B840-978EF5EA0707}" type="datetime1">
               <a:rPr lang="en-US" smtClean="0"/>
-              <a:t>3/5/2023</a:t>
+              <a:t>3/19/2023</a:t>
             </a:fld>
             <a:endParaRPr lang="en-US"/>
           </a:p>
@@ -2736,7 +2736,7 @@
           <a:p>
             <a:fld id="{FC366D49-0BBA-4C5A-AD96-6448CA63451A}" type="datetime1">
               <a:rPr lang="en-US" smtClean="0"/>
-              <a:t>3/5/2023</a:t>
+              <a:t>3/19/2023</a:t>
             </a:fld>
             <a:endParaRPr lang="en-US"/>
           </a:p>
@@ -3033,7 +3033,7 @@
           <a:p>
             <a:fld id="{4F4EB293-A316-472D-A8B4-6947CF1A12B7}" type="datetime1">
               <a:rPr lang="en-US" smtClean="0"/>
-              <a:t>3/5/2023</a:t>
+              <a:t>3/19/2023</a:t>
             </a:fld>
             <a:endParaRPr lang="en-US"/>
           </a:p>
@@ -3312,7 +3312,7 @@
           <a:p>
             <a:fld id="{734BCCD4-CEB1-405B-A443-DD9CBCBEA552}" type="datetime1">
               <a:rPr lang="en-US" smtClean="0"/>
-              <a:t>3/5/2023</a:t>
+              <a:t>3/19/2023</a:t>
             </a:fld>
             <a:endParaRPr lang="en-US"/>
           </a:p>
@@ -3795,7 +3795,7 @@
                 <a16:creationId xmlns:a16="http://schemas.microsoft.com/office/drawing/2014/main" id="{956C5C09-0043-4549-B800-2101B70D667D}"/>
               </a:ext>
               <a:ext uri="{C183D7F6-B498-43B3-948B-1728B52AA6E4}">
-                <adec:decorative xmlns="" xmlns:adec="http://schemas.microsoft.com/office/drawing/2017/decorative" val="1"/>
+                <adec:decorative xmlns:adec="http://schemas.microsoft.com/office/drawing/2017/decorative" xmlns="" val="1"/>
               </a:ext>
             </a:extLst>
           </p:cNvPr>
@@ -3855,7 +3855,7 @@
                 <a16:creationId xmlns:a16="http://schemas.microsoft.com/office/drawing/2014/main" id="{B7E2F724-2FB3-4D1D-A730-739B8654C030}"/>
               </a:ext>
               <a:ext uri="{C183D7F6-B498-43B3-948B-1728B52AA6E4}">
-                <adec:decorative xmlns="" xmlns:adec="http://schemas.microsoft.com/office/drawing/2017/decorative" val="1"/>
+                <adec:decorative xmlns:adec="http://schemas.microsoft.com/office/drawing/2017/decorative" xmlns="" val="1"/>
               </a:ext>
             </a:extLst>
           </p:cNvPr>
@@ -4146,7 +4146,7 @@
                 <a16:creationId xmlns:a16="http://schemas.microsoft.com/office/drawing/2014/main" id="{B2C335F7-F61C-4EB4-80F2-4B1438FE66BB}"/>
               </a:ext>
               <a:ext uri="{C183D7F6-B498-43B3-948B-1728B52AA6E4}">
-                <adec:decorative xmlns="" xmlns:adec="http://schemas.microsoft.com/office/drawing/2017/decorative" val="1"/>
+                <adec:decorative xmlns:adec="http://schemas.microsoft.com/office/drawing/2017/decorative" xmlns="" val="1"/>
               </a:ext>
             </a:extLst>
           </p:cNvPr>
@@ -4277,7 +4277,7 @@
                 <a16:creationId xmlns:a16="http://schemas.microsoft.com/office/drawing/2014/main" id="{FAA3B297-9683-4E38-89FA-062C53E13F85}"/>
               </a:ext>
               <a:ext uri="{C183D7F6-B498-43B3-948B-1728B52AA6E4}">
-                <adec:decorative xmlns="" xmlns:adec="http://schemas.microsoft.com/office/drawing/2017/decorative" val="1"/>
+                <adec:decorative xmlns:adec="http://schemas.microsoft.com/office/drawing/2017/decorative" xmlns="" val="1"/>
               </a:ext>
             </a:extLst>
           </p:cNvPr>
@@ -4372,7 +4372,7 @@
                 <a16:creationId xmlns:a16="http://schemas.microsoft.com/office/drawing/2014/main" id="{5B8D7907-8AB9-4E98-A576-1A13AECEDF3A}"/>
               </a:ext>
               <a:ext uri="{C183D7F6-B498-43B3-948B-1728B52AA6E4}">
-                <adec:decorative xmlns="" xmlns:adec="http://schemas.microsoft.com/office/drawing/2017/decorative" val="1"/>
+                <adec:decorative xmlns:adec="http://schemas.microsoft.com/office/drawing/2017/decorative" xmlns="" val="1"/>
               </a:ext>
             </a:extLst>
           </p:cNvPr>
@@ -4505,7 +4505,7 @@
                 <a16:creationId xmlns:a16="http://schemas.microsoft.com/office/drawing/2014/main" id="{FAA3B297-9683-4E38-89FA-062C53E13F85}"/>
               </a:ext>
               <a:ext uri="{C183D7F6-B498-43B3-948B-1728B52AA6E4}">
-                <adec:decorative xmlns="" xmlns:adec="http://schemas.microsoft.com/office/drawing/2017/decorative" val="1"/>
+                <adec:decorative xmlns:adec="http://schemas.microsoft.com/office/drawing/2017/decorative" xmlns="" val="1"/>
               </a:ext>
             </a:extLst>
           </p:cNvPr>
@@ -4600,7 +4600,7 @@
                 <a16:creationId xmlns:a16="http://schemas.microsoft.com/office/drawing/2014/main" id="{5B8D7907-8AB9-4E98-A576-1A13AECEDF3A}"/>
               </a:ext>
               <a:ext uri="{C183D7F6-B498-43B3-948B-1728B52AA6E4}">
-                <adec:decorative xmlns="" xmlns:adec="http://schemas.microsoft.com/office/drawing/2017/decorative" val="1"/>
+                <adec:decorative xmlns:adec="http://schemas.microsoft.com/office/drawing/2017/decorative" xmlns="" val="1"/>
               </a:ext>
             </a:extLst>
           </p:cNvPr>
@@ -4733,7 +4733,7 @@
                 <a16:creationId xmlns:a16="http://schemas.microsoft.com/office/drawing/2014/main" id="{FAA3B297-9683-4E38-89FA-062C53E13F85}"/>
               </a:ext>
               <a:ext uri="{C183D7F6-B498-43B3-948B-1728B52AA6E4}">
-                <adec:decorative xmlns="" xmlns:adec="http://schemas.microsoft.com/office/drawing/2017/decorative" val="1"/>
+                <adec:decorative xmlns:adec="http://schemas.microsoft.com/office/drawing/2017/decorative" xmlns="" val="1"/>
               </a:ext>
             </a:extLst>
           </p:cNvPr>
@@ -4831,7 +4831,7 @@
                 <a16:creationId xmlns:a16="http://schemas.microsoft.com/office/drawing/2014/main" id="{5B8D7907-8AB9-4E98-A576-1A13AECEDF3A}"/>
               </a:ext>
               <a:ext uri="{C183D7F6-B498-43B3-948B-1728B52AA6E4}">
-                <adec:decorative xmlns="" xmlns:adec="http://schemas.microsoft.com/office/drawing/2017/decorative" val="1"/>
+                <adec:decorative xmlns:adec="http://schemas.microsoft.com/office/drawing/2017/decorative" xmlns="" val="1"/>
               </a:ext>
             </a:extLst>
           </p:cNvPr>
@@ -5006,7 +5006,7 @@
                 <a16:creationId xmlns:a16="http://schemas.microsoft.com/office/drawing/2014/main" id="{FAA3B297-9683-4E38-89FA-062C53E13F85}"/>
               </a:ext>
               <a:ext uri="{C183D7F6-B498-43B3-948B-1728B52AA6E4}">
-                <adec:decorative xmlns="" xmlns:adec="http://schemas.microsoft.com/office/drawing/2017/decorative" val="1"/>
+                <adec:decorative xmlns:adec="http://schemas.microsoft.com/office/drawing/2017/decorative" xmlns="" val="1"/>
               </a:ext>
             </a:extLst>
           </p:cNvPr>
@@ -5101,7 +5101,7 @@
                 <a16:creationId xmlns:a16="http://schemas.microsoft.com/office/drawing/2014/main" id="{5B8D7907-8AB9-4E98-A576-1A13AECEDF3A}"/>
               </a:ext>
               <a:ext uri="{C183D7F6-B498-43B3-948B-1728B52AA6E4}">
-                <adec:decorative xmlns="" xmlns:adec="http://schemas.microsoft.com/office/drawing/2017/decorative" val="1"/>
+                <adec:decorative xmlns:adec="http://schemas.microsoft.com/office/drawing/2017/decorative" xmlns="" val="1"/>
               </a:ext>
             </a:extLst>
           </p:cNvPr>
@@ -5313,7 +5313,7 @@
                 <a16:creationId xmlns:a16="http://schemas.microsoft.com/office/drawing/2014/main" id="{FAA3B297-9683-4E38-89FA-062C53E13F85}"/>
               </a:ext>
               <a:ext uri="{C183D7F6-B498-43B3-948B-1728B52AA6E4}">
-                <adec:decorative xmlns="" xmlns:adec="http://schemas.microsoft.com/office/drawing/2017/decorative" val="1"/>
+                <adec:decorative xmlns:adec="http://schemas.microsoft.com/office/drawing/2017/decorative" xmlns="" val="1"/>
               </a:ext>
             </a:extLst>
           </p:cNvPr>
@@ -5408,7 +5408,7 @@
                 <a16:creationId xmlns:a16="http://schemas.microsoft.com/office/drawing/2014/main" id="{5B8D7907-8AB9-4E98-A576-1A13AECEDF3A}"/>
               </a:ext>
               <a:ext uri="{C183D7F6-B498-43B3-948B-1728B52AA6E4}">
-                <adec:decorative xmlns="" xmlns:adec="http://schemas.microsoft.com/office/drawing/2017/decorative" val="1"/>
+                <adec:decorative xmlns:adec="http://schemas.microsoft.com/office/drawing/2017/decorative" xmlns="" val="1"/>
               </a:ext>
             </a:extLst>
           </p:cNvPr>
@@ -5660,7 +5660,7 @@
                 <a16:creationId xmlns:a16="http://schemas.microsoft.com/office/drawing/2014/main" id="{FAA3B297-9683-4E38-89FA-062C53E13F85}"/>
               </a:ext>
               <a:ext uri="{C183D7F6-B498-43B3-948B-1728B52AA6E4}">
-                <adec:decorative xmlns="" xmlns:adec="http://schemas.microsoft.com/office/drawing/2017/decorative" val="1"/>
+                <adec:decorative xmlns:adec="http://schemas.microsoft.com/office/drawing/2017/decorative" xmlns="" val="1"/>
               </a:ext>
             </a:extLst>
           </p:cNvPr>
@@ -5755,7 +5755,7 @@
                 <a16:creationId xmlns:a16="http://schemas.microsoft.com/office/drawing/2014/main" id="{5B8D7907-8AB9-4E98-A576-1A13AECEDF3A}"/>
               </a:ext>
               <a:ext uri="{C183D7F6-B498-43B3-948B-1728B52AA6E4}">
-                <adec:decorative xmlns="" xmlns:adec="http://schemas.microsoft.com/office/drawing/2017/decorative" val="1"/>
+                <adec:decorative xmlns:adec="http://schemas.microsoft.com/office/drawing/2017/decorative" xmlns="" val="1"/>
               </a:ext>
             </a:extLst>
           </p:cNvPr>
@@ -6079,7 +6079,7 @@
                 <a16:creationId xmlns:a16="http://schemas.microsoft.com/office/drawing/2014/main" id="{FAA3B297-9683-4E38-89FA-062C53E13F85}"/>
               </a:ext>
               <a:ext uri="{C183D7F6-B498-43B3-948B-1728B52AA6E4}">
-                <adec:decorative xmlns="" xmlns:adec="http://schemas.microsoft.com/office/drawing/2017/decorative" val="1"/>
+                <adec:decorative xmlns:adec="http://schemas.microsoft.com/office/drawing/2017/decorative" xmlns="" val="1"/>
               </a:ext>
             </a:extLst>
           </p:cNvPr>
@@ -6181,7 +6181,7 @@
                 <a16:creationId xmlns:a16="http://schemas.microsoft.com/office/drawing/2014/main" id="{5B8D7907-8AB9-4E98-A576-1A13AECEDF3A}"/>
               </a:ext>
               <a:ext uri="{C183D7F6-B498-43B3-948B-1728B52AA6E4}">
-                <adec:decorative xmlns="" xmlns:adec="http://schemas.microsoft.com/office/drawing/2017/decorative" val="1"/>
+                <adec:decorative xmlns:adec="http://schemas.microsoft.com/office/drawing/2017/decorative" xmlns="" val="1"/>
               </a:ext>
             </a:extLst>
           </p:cNvPr>
@@ -6445,76 +6445,16 @@
           <a:bodyPr/>
           <a:lstStyle/>
           <a:p>
-            <a:r>
-              <a:rPr lang="en-US" b="1" dirty="0">
-                <a:latin typeface="Arial" panose="020B0604020202020204" pitchFamily="34" charset="0"/>
-                <a:ea typeface="Black Han Sans" panose="020B0604020202020204" charset="-127"/>
-                <a:cs typeface="Arial" panose="020B0604020202020204" pitchFamily="34" charset="0"/>
-              </a:rPr>
-              <a:t>For Image</a:t>
-            </a:r>
-          </a:p>
-          <a:p>
-            <a:endParaRPr lang="en-US" dirty="0">
+            <a:endParaRPr lang="en-US" b="1" dirty="0">
               <a:latin typeface="Arial" panose="020B0604020202020204" pitchFamily="34" charset="0"/>
               <a:ea typeface="Black Han Sans" panose="020B0604020202020204" charset="-127"/>
               <a:cs typeface="Arial" panose="020B0604020202020204" pitchFamily="34" charset="0"/>
             </a:endParaRPr>
           </a:p>
           <a:p>
-            <a:r>
-              <a:rPr lang="en-US" dirty="0">
-                <a:latin typeface="Arial" panose="020B0604020202020204" pitchFamily="34" charset="0"/>
-                <a:cs typeface="Arial" panose="020B0604020202020204" pitchFamily="34" charset="0"/>
-              </a:rPr>
-              <a:t>The datasets are downloaded as.jpg files and </a:t>
-            </a:r>
-            <a:r>
-              <a:rPr lang="en-US" dirty="0" err="1">
-                <a:latin typeface="Arial" panose="020B0604020202020204" pitchFamily="34" charset="0"/>
-                <a:cs typeface="Arial" panose="020B0604020202020204" pitchFamily="34" charset="0"/>
-              </a:rPr>
-              <a:t>binarized</a:t>
-            </a:r>
-            <a:r>
-              <a:rPr lang="en-US" dirty="0">
-                <a:latin typeface="Arial" panose="020B0604020202020204" pitchFamily="34" charset="0"/>
-                <a:cs typeface="Arial" panose="020B0604020202020204" pitchFamily="34" charset="0"/>
-              </a:rPr>
-              <a:t> using an encoder with a homeostatic plasticity controller for stability</a:t>
-            </a:r>
-            <a:r>
-              <a:rPr lang="en-US" dirty="0" smtClean="0">
-                <a:latin typeface="Arial" panose="020B0604020202020204" pitchFamily="34" charset="0"/>
-                <a:cs typeface="Arial" panose="020B0604020202020204" pitchFamily="34" charset="0"/>
-              </a:rPr>
-              <a:t>.</a:t>
-            </a:r>
-          </a:p>
-          <a:p>
-            <a:r>
-              <a:rPr lang="en-US" dirty="0" smtClean="0">
-                <a:latin typeface="Arial" panose="020B0604020202020204" pitchFamily="34" charset="0"/>
-                <a:cs typeface="Arial" panose="020B0604020202020204" pitchFamily="34" charset="0"/>
-              </a:rPr>
-              <a:t>The </a:t>
-            </a:r>
-            <a:r>
-              <a:rPr lang="en-US" dirty="0" err="1">
-                <a:latin typeface="Arial" panose="020B0604020202020204" pitchFamily="34" charset="0"/>
-                <a:cs typeface="Arial" panose="020B0604020202020204" pitchFamily="34" charset="0"/>
-              </a:rPr>
-              <a:t>binarized</a:t>
-            </a:r>
-            <a:r>
-              <a:rPr lang="en-US" dirty="0">
-                <a:latin typeface="Arial" panose="020B0604020202020204" pitchFamily="34" charset="0"/>
-                <a:cs typeface="Arial" panose="020B0604020202020204" pitchFamily="34" charset="0"/>
-              </a:rPr>
-              <a:t> datasets are used to train Spatial Pooler via numerous rounds until it reaches a stable state.</a:t>
-            </a:r>
-            <a:endParaRPr lang="en-IN" dirty="0">
+            <a:endParaRPr lang="en-US" dirty="0">
               <a:latin typeface="Arial" panose="020B0604020202020204" pitchFamily="34" charset="0"/>
+              <a:ea typeface="Black Han Sans" panose="020B0604020202020204" charset="-127"/>
               <a:cs typeface="Arial" panose="020B0604020202020204" pitchFamily="34" charset="0"/>
             </a:endParaRPr>
           </a:p>
@@ -6573,7 +6513,7 @@
                 <a16:creationId xmlns:a16="http://schemas.microsoft.com/office/drawing/2014/main" id="{FAA3B297-9683-4E38-89FA-062C53E13F85}"/>
               </a:ext>
               <a:ext uri="{C183D7F6-B498-43B3-948B-1728B52AA6E4}">
-                <adec:decorative xmlns="" xmlns:adec="http://schemas.microsoft.com/office/drawing/2017/decorative" val="1"/>
+                <adec:decorative xmlns:adec="http://schemas.microsoft.com/office/drawing/2017/decorative" xmlns="" val="1"/>
               </a:ext>
             </a:extLst>
           </p:cNvPr>
@@ -6671,7 +6611,7 @@
                 <a16:creationId xmlns:a16="http://schemas.microsoft.com/office/drawing/2014/main" id="{5B8D7907-8AB9-4E98-A576-1A13AECEDF3A}"/>
               </a:ext>
               <a:ext uri="{C183D7F6-B498-43B3-948B-1728B52AA6E4}">
-                <adec:decorative xmlns="" xmlns:adec="http://schemas.microsoft.com/office/drawing/2017/decorative" val="1"/>
+                <adec:decorative xmlns:adec="http://schemas.microsoft.com/office/drawing/2017/decorative" xmlns="" val="1"/>
               </a:ext>
             </a:extLst>
           </p:cNvPr>

</xml_diff>

<commit_message>
added comments to the code and document updation
</commit_message>
<xml_diff>
--- a/source/MySEProject/Documentation/ML-22-23-15 Approve Prediction of Multisequence Learning .pptx
+++ b/source/MySEProject/Documentation/ML-22-23-15 Approve Prediction of Multisequence Learning .pptx
@@ -8163,7 +8163,7 @@
           </a:bodyPr>
           <a:lstStyle/>
           <a:p>
-            <a:endParaRPr lang="en-US"/>
+            <a:endParaRPr lang="en-US" dirty="0"/>
           </a:p>
         </p:txBody>
       </p:sp>
@@ -8820,7 +8820,7 @@
         </p:nvSpPr>
         <p:spPr>
           <a:xfrm>
-            <a:off x="563590" y="1800225"/>
+            <a:off x="527686" y="1549353"/>
             <a:ext cx="11123585" cy="4928605"/>
           </a:xfrm>
         </p:spPr>
@@ -8923,17 +8923,17 @@
             <a:pPr algn="ctr"/>
             <a:r>
               <a:rPr lang="en-US" dirty="0"/>
-              <a:t>Enter an Option to run multisequence</a:t>
-            </a:r>
-          </a:p>
-        </p:txBody>
-      </p:sp>
-      <p:sp>
-        <p:nvSpPr>
-          <p:cNvPr id="7" name="Diamond 6">
-            <a:extLst>
-              <a:ext uri="{FF2B5EF4-FFF2-40B4-BE49-F238E27FC236}">
-                <a16:creationId xmlns:a16="http://schemas.microsoft.com/office/drawing/2014/main" id="{8AF84960-DC45-1CE8-1E6E-1E6466D6DD9E}"/>
+              <a:t>Multi-Sequences  stored in the file</a:t>
+            </a:r>
+          </a:p>
+        </p:txBody>
+      </p:sp>
+      <p:sp>
+        <p:nvSpPr>
+          <p:cNvPr id="13" name="Rectangle 12">
+            <a:extLst>
+              <a:ext uri="{FF2B5EF4-FFF2-40B4-BE49-F238E27FC236}">
+                <a16:creationId xmlns:a16="http://schemas.microsoft.com/office/drawing/2014/main" id="{5A3EB07F-15B0-B1D8-01BF-94072B1EA615}"/>
               </a:ext>
             </a:extLst>
           </p:cNvPr>
@@ -8942,101 +8942,7 @@
         </p:nvSpPr>
         <p:spPr>
           <a:xfrm>
-            <a:off x="733613" y="4246839"/>
-            <a:ext cx="2657474" cy="1304215"/>
-          </a:xfrm>
-          <a:prstGeom prst="diamond">
-            <a:avLst/>
-          </a:prstGeom>
-        </p:spPr>
-        <p:style>
-          <a:lnRef idx="2">
-            <a:schemeClr val="accent6"/>
-          </a:lnRef>
-          <a:fillRef idx="1">
-            <a:schemeClr val="lt1"/>
-          </a:fillRef>
-          <a:effectRef idx="0">
-            <a:schemeClr val="accent6"/>
-          </a:effectRef>
-          <a:fontRef idx="minor">
-            <a:schemeClr val="dk1"/>
-          </a:fontRef>
-        </p:style>
-        <p:txBody>
-          <a:bodyPr rtlCol="0" anchor="ctr"/>
-          <a:lstStyle/>
-          <a:p>
-            <a:pPr algn="ctr"/>
-            <a:r>
-              <a:rPr lang="en-US" dirty="0"/>
-              <a:t> Sequences from the file</a:t>
-            </a:r>
-          </a:p>
-        </p:txBody>
-      </p:sp>
-      <p:sp>
-        <p:nvSpPr>
-          <p:cNvPr id="12" name="Rectangle 11">
-            <a:extLst>
-              <a:ext uri="{FF2B5EF4-FFF2-40B4-BE49-F238E27FC236}">
-                <a16:creationId xmlns:a16="http://schemas.microsoft.com/office/drawing/2014/main" id="{3019948E-00D5-D4C6-5E49-6407ECE469EC}"/>
-              </a:ext>
-            </a:extLst>
-          </p:cNvPr>
-          <p:cNvSpPr/>
-          <p:nvPr/>
-        </p:nvSpPr>
-        <p:spPr>
-          <a:xfrm>
-            <a:off x="4206903" y="4353456"/>
-            <a:ext cx="1943100" cy="956757"/>
-          </a:xfrm>
-          <a:prstGeom prst="rect">
-            <a:avLst/>
-          </a:prstGeom>
-        </p:spPr>
-        <p:style>
-          <a:lnRef idx="2">
-            <a:schemeClr val="accent6"/>
-          </a:lnRef>
-          <a:fillRef idx="1">
-            <a:schemeClr val="lt1"/>
-          </a:fillRef>
-          <a:effectRef idx="0">
-            <a:schemeClr val="accent6"/>
-          </a:effectRef>
-          <a:fontRef idx="minor">
-            <a:schemeClr val="dk1"/>
-          </a:fontRef>
-        </p:style>
-        <p:txBody>
-          <a:bodyPr rtlCol="0" anchor="ctr"/>
-          <a:lstStyle/>
-          <a:p>
-            <a:pPr algn="ctr"/>
-            <a:r>
-              <a:rPr lang="en-US" dirty="0"/>
-              <a:t>Multi-Sequence Numbers</a:t>
-            </a:r>
-          </a:p>
-        </p:txBody>
-      </p:sp>
-      <p:sp>
-        <p:nvSpPr>
-          <p:cNvPr id="13" name="Rectangle 12">
-            <a:extLst>
-              <a:ext uri="{FF2B5EF4-FFF2-40B4-BE49-F238E27FC236}">
-                <a16:creationId xmlns:a16="http://schemas.microsoft.com/office/drawing/2014/main" id="{5A3EB07F-15B0-B1D8-01BF-94072B1EA615}"/>
-              </a:ext>
-            </a:extLst>
-          </p:cNvPr>
-          <p:cNvSpPr/>
-          <p:nvPr/>
-        </p:nvSpPr>
-        <p:spPr>
-          <a:xfrm>
-            <a:off x="6829423" y="4353456"/>
+            <a:off x="1207294" y="4393648"/>
             <a:ext cx="1500187" cy="956757"/>
           </a:xfrm>
           <a:prstGeom prst="rect">
@@ -9083,7 +8989,7 @@
         </p:nvSpPr>
         <p:spPr>
           <a:xfrm>
-            <a:off x="8850254" y="4301078"/>
+            <a:off x="3709843" y="4387332"/>
             <a:ext cx="1943099" cy="970470"/>
           </a:xfrm>
           <a:prstGeom prst="parallelogram">
@@ -9111,7 +9017,7 @@
             <a:pPr algn="ctr"/>
             <a:r>
               <a:rPr lang="en-US" dirty="0"/>
-              <a:t>Enter input Data Sequences</a:t>
+              <a:t>Enter Test- Data Sequences</a:t>
             </a:r>
           </a:p>
         </p:txBody>
@@ -9130,7 +9036,7 @@
         </p:nvSpPr>
         <p:spPr>
           <a:xfrm>
-            <a:off x="8902020" y="5667587"/>
+            <a:off x="6304928" y="4496943"/>
             <a:ext cx="1839566" cy="792072"/>
           </a:xfrm>
           <a:prstGeom prst="roundRect">
@@ -9177,7 +9083,7 @@
         </p:nvSpPr>
         <p:spPr>
           <a:xfrm>
-            <a:off x="7063596" y="5819274"/>
+            <a:off x="8835099" y="4606692"/>
             <a:ext cx="1336647" cy="572574"/>
           </a:xfrm>
           <a:prstGeom prst="ellipse">
@@ -9268,8 +9174,8 @@
         </p:nvSpPr>
         <p:spPr>
           <a:xfrm>
-            <a:off x="2000250" y="3866666"/>
-            <a:ext cx="142876" cy="354294"/>
+            <a:off x="1923985" y="3889489"/>
+            <a:ext cx="223966" cy="478966"/>
           </a:xfrm>
           <a:prstGeom prst="downArrow">
             <a:avLst/>
@@ -9300,10 +9206,10 @@
       </p:sp>
       <p:sp>
         <p:nvSpPr>
-          <p:cNvPr id="20" name="Right Arrow 19">
-            <a:extLst>
-              <a:ext uri="{FF2B5EF4-FFF2-40B4-BE49-F238E27FC236}">
-                <a16:creationId xmlns:a16="http://schemas.microsoft.com/office/drawing/2014/main" id="{243B01DA-83B4-448B-550A-0D13F3E691F3}"/>
+          <p:cNvPr id="9" name="Right Arrow 8">
+            <a:extLst>
+              <a:ext uri="{FF2B5EF4-FFF2-40B4-BE49-F238E27FC236}">
+                <a16:creationId xmlns:a16="http://schemas.microsoft.com/office/drawing/2014/main" id="{56627477-6447-0E82-4ADF-1AA0C507CC8C}"/>
               </a:ext>
             </a:extLst>
           </p:cNvPr>
@@ -9312,8 +9218,8 @@
         </p:nvSpPr>
         <p:spPr>
           <a:xfrm>
-            <a:off x="3446529" y="4786313"/>
-            <a:ext cx="760373" cy="199191"/>
+            <a:off x="2707481" y="4769708"/>
+            <a:ext cx="1086043" cy="197708"/>
           </a:xfrm>
           <a:prstGeom prst="rightArrow">
             <a:avLst/>
@@ -9344,10 +9250,10 @@
       </p:sp>
       <p:sp>
         <p:nvSpPr>
-          <p:cNvPr id="22" name="Right Arrow 21">
-            <a:extLst>
-              <a:ext uri="{FF2B5EF4-FFF2-40B4-BE49-F238E27FC236}">
-                <a16:creationId xmlns:a16="http://schemas.microsoft.com/office/drawing/2014/main" id="{0985FECF-DE04-1750-99CB-D732AFD15C56}"/>
+          <p:cNvPr id="11" name="Right Arrow 10">
+            <a:extLst>
+              <a:ext uri="{FF2B5EF4-FFF2-40B4-BE49-F238E27FC236}">
+                <a16:creationId xmlns:a16="http://schemas.microsoft.com/office/drawing/2014/main" id="{3410A266-B8BB-EE85-EA3D-1FF97F82D2ED}"/>
               </a:ext>
             </a:extLst>
           </p:cNvPr>
@@ -9356,8 +9262,8 @@
         </p:nvSpPr>
         <p:spPr>
           <a:xfrm>
-            <a:off x="6150003" y="4786314"/>
-            <a:ext cx="679420" cy="246378"/>
+            <a:off x="5569890" y="4818543"/>
+            <a:ext cx="705327" cy="148873"/>
           </a:xfrm>
           <a:prstGeom prst="rightArrow">
             <a:avLst/>
@@ -9382,16 +9288,16 @@
           <a:lstStyle/>
           <a:p>
             <a:pPr algn="ctr"/>
-            <a:endParaRPr lang="en-US" dirty="0"/>
-          </a:p>
-        </p:txBody>
-      </p:sp>
-      <p:sp>
-        <p:nvSpPr>
-          <p:cNvPr id="23" name="Right Arrow 22">
-            <a:extLst>
-              <a:ext uri="{FF2B5EF4-FFF2-40B4-BE49-F238E27FC236}">
-                <a16:creationId xmlns:a16="http://schemas.microsoft.com/office/drawing/2014/main" id="{A0A7EE86-6E51-9825-163D-400BC5DA7136}"/>
+            <a:endParaRPr lang="en-US"/>
+          </a:p>
+        </p:txBody>
+      </p:sp>
+      <p:sp>
+        <p:nvSpPr>
+          <p:cNvPr id="21" name="Right Arrow 20">
+            <a:extLst>
+              <a:ext uri="{FF2B5EF4-FFF2-40B4-BE49-F238E27FC236}">
+                <a16:creationId xmlns:a16="http://schemas.microsoft.com/office/drawing/2014/main" id="{E362A932-2CCA-A85C-382B-9920ECA90B48}"/>
               </a:ext>
             </a:extLst>
           </p:cNvPr>
@@ -9400,98 +9306,10 @@
         </p:nvSpPr>
         <p:spPr>
           <a:xfrm>
-            <a:off x="8329610" y="4786313"/>
-            <a:ext cx="572410" cy="199191"/>
+            <a:off x="8144494" y="4818543"/>
+            <a:ext cx="641160" cy="148873"/>
           </a:xfrm>
           <a:prstGeom prst="rightArrow">
-            <a:avLst/>
-          </a:prstGeom>
-        </p:spPr>
-        <p:style>
-          <a:lnRef idx="2">
-            <a:schemeClr val="accent6"/>
-          </a:lnRef>
-          <a:fillRef idx="1">
-            <a:schemeClr val="lt1"/>
-          </a:fillRef>
-          <a:effectRef idx="0">
-            <a:schemeClr val="accent6"/>
-          </a:effectRef>
-          <a:fontRef idx="minor">
-            <a:schemeClr val="dk1"/>
-          </a:fontRef>
-        </p:style>
-        <p:txBody>
-          <a:bodyPr rtlCol="0" anchor="ctr"/>
-          <a:lstStyle/>
-          <a:p>
-            <a:pPr algn="ctr"/>
-            <a:endParaRPr lang="en-US"/>
-          </a:p>
-        </p:txBody>
-      </p:sp>
-      <p:sp>
-        <p:nvSpPr>
-          <p:cNvPr id="24" name="Down Arrow 23">
-            <a:extLst>
-              <a:ext uri="{FF2B5EF4-FFF2-40B4-BE49-F238E27FC236}">
-                <a16:creationId xmlns:a16="http://schemas.microsoft.com/office/drawing/2014/main" id="{8F5C5CB4-3F19-8368-5CCB-E6AFB6A457EE}"/>
-              </a:ext>
-            </a:extLst>
-          </p:cNvPr>
-          <p:cNvSpPr/>
-          <p:nvPr/>
-        </p:nvSpPr>
-        <p:spPr>
-          <a:xfrm>
-            <a:off x="9644063" y="5271548"/>
-            <a:ext cx="177740" cy="396039"/>
-          </a:xfrm>
-          <a:prstGeom prst="downArrow">
-            <a:avLst/>
-          </a:prstGeom>
-        </p:spPr>
-        <p:style>
-          <a:lnRef idx="2">
-            <a:schemeClr val="accent6"/>
-          </a:lnRef>
-          <a:fillRef idx="1">
-            <a:schemeClr val="lt1"/>
-          </a:fillRef>
-          <a:effectRef idx="0">
-            <a:schemeClr val="accent6"/>
-          </a:effectRef>
-          <a:fontRef idx="minor">
-            <a:schemeClr val="dk1"/>
-          </a:fontRef>
-        </p:style>
-        <p:txBody>
-          <a:bodyPr rtlCol="0" anchor="ctr"/>
-          <a:lstStyle/>
-          <a:p>
-            <a:pPr algn="ctr"/>
-            <a:endParaRPr lang="en-US"/>
-          </a:p>
-        </p:txBody>
-      </p:sp>
-      <p:sp>
-        <p:nvSpPr>
-          <p:cNvPr id="25" name="Left Arrow 24">
-            <a:extLst>
-              <a:ext uri="{FF2B5EF4-FFF2-40B4-BE49-F238E27FC236}">
-                <a16:creationId xmlns:a16="http://schemas.microsoft.com/office/drawing/2014/main" id="{7C12F5D7-9856-3E45-FB35-2F1A63B0C89A}"/>
-              </a:ext>
-            </a:extLst>
-          </p:cNvPr>
-          <p:cNvSpPr/>
-          <p:nvPr/>
-        </p:nvSpPr>
-        <p:spPr>
-          <a:xfrm>
-            <a:off x="8400243" y="5987299"/>
-            <a:ext cx="501777" cy="199190"/>
-          </a:xfrm>
-          <a:prstGeom prst="leftArrow">
             <a:avLst/>
           </a:prstGeom>
         </p:spPr>

</xml_diff>

<commit_message>
updated the documentation and ppt
</commit_message>
<xml_diff>
--- a/source/MySEProject/Documentation/ML-22-23-15 Approve Prediction of Multisequence Learning .pptx
+++ b/source/MySEProject/Documentation/ML-22-23-15 Approve Prediction of Multisequence Learning .pptx
@@ -5,7 +5,7 @@
     <p:sldMasterId id="2147483801" r:id="rId1"/>
   </p:sldMasterIdLst>
   <p:notesMasterIdLst>
-    <p:notesMasterId r:id="rId16"/>
+    <p:notesMasterId r:id="rId17"/>
   </p:notesMasterIdLst>
   <p:sldIdLst>
     <p:sldId id="256" r:id="rId2"/>
@@ -21,7 +21,8 @@
     <p:sldId id="262" r:id="rId12"/>
     <p:sldId id="263" r:id="rId13"/>
     <p:sldId id="264" r:id="rId14"/>
-    <p:sldId id="271" r:id="rId15"/>
+    <p:sldId id="272" r:id="rId15"/>
+    <p:sldId id="271" r:id="rId16"/>
   </p:sldIdLst>
   <p:sldSz cx="12192000" cy="6858000"/>
   <p:notesSz cx="6858000" cy="9144000"/>
@@ -131,7 +132,7 @@
 <file path=ppt/charts/chart1.xml><?xml version="1.0" encoding="utf-8"?>
 <c:chartSpace xmlns:c="http://schemas.openxmlformats.org/drawingml/2006/chart" xmlns:a="http://schemas.openxmlformats.org/drawingml/2006/main" xmlns:r="http://schemas.openxmlformats.org/officeDocument/2006/relationships" xmlns:c16r2="http://schemas.microsoft.com/office/drawing/2015/06/chart">
   <c:date1904 val="0"/>
-  <c:lang val="en-US"/>
+  <c:lang val="en-GB"/>
   <c:roundedCorners val="0"/>
   <mc:AlternateContent xmlns:mc="http://schemas.openxmlformats.org/markup-compatibility/2006">
     <mc:Choice xmlns:c14="http://schemas.microsoft.com/office/drawing/2007/8/2/chart" Requires="c14">
@@ -174,7 +175,6 @@
           </a:p>
         </c:rich>
       </c:tx>
-      <c:layout/>
       <c:overlay val="0"/>
       <c:spPr>
         <a:noFill/>
@@ -200,7 +200,7 @@
               <a:cs typeface="+mn-cs"/>
             </a:defRPr>
           </a:pPr>
-          <a:endParaRPr lang="ar-SA"/>
+          <a:endParaRPr lang="en-US"/>
         </a:p>
       </c:txPr>
     </c:title>
@@ -1482,7 +1482,6 @@
               </a:p>
             </c:rich>
           </c:tx>
-          <c:layout/>
           <c:overlay val="0"/>
           <c:spPr>
             <a:noFill/>
@@ -1508,7 +1507,7 @@
                   <a:cs typeface="+mn-cs"/>
                 </a:defRPr>
               </a:pPr>
-              <a:endParaRPr lang="ar-SA"/>
+              <a:endParaRPr lang="en-US"/>
             </a:p>
           </c:txPr>
         </c:title>
@@ -1546,7 +1545,7 @@
                 <a:cs typeface="+mn-cs"/>
               </a:defRPr>
             </a:pPr>
-            <a:endParaRPr lang="ar-SA"/>
+            <a:endParaRPr lang="en-US"/>
           </a:p>
         </c:txPr>
         <c:crossAx val="621561208"/>
@@ -1606,7 +1605,6 @@
               </a:p>
             </c:rich>
           </c:tx>
-          <c:layout/>
           <c:overlay val="0"/>
           <c:spPr>
             <a:noFill/>
@@ -1632,7 +1630,7 @@
                   <a:cs typeface="+mn-cs"/>
                 </a:defRPr>
               </a:pPr>
-              <a:endParaRPr lang="ar-SA"/>
+              <a:endParaRPr lang="en-US"/>
             </a:p>
           </c:txPr>
         </c:title>
@@ -1670,7 +1668,7 @@
                 <a:cs typeface="+mn-cs"/>
               </a:defRPr>
             </a:pPr>
-            <a:endParaRPr lang="ar-SA"/>
+            <a:endParaRPr lang="en-US"/>
           </a:p>
         </c:txPr>
         <c:crossAx val="621560888"/>
@@ -1687,7 +1685,6 @@
     </c:plotArea>
     <c:legend>
       <c:legendPos val="b"/>
-      <c:layout/>
       <c:overlay val="0"/>
       <c:spPr>
         <a:noFill/>
@@ -1713,13 +1710,12 @@
               <a:cs typeface="+mn-cs"/>
             </a:defRPr>
           </a:pPr>
-          <a:endParaRPr lang="ar-SA"/>
+          <a:endParaRPr lang="en-US"/>
         </a:p>
       </c:txPr>
     </c:legend>
     <c:plotVisOnly val="1"/>
     <c:dispBlanksAs val="gap"/>
-    <c:showDLblsOverMax val="0"/>
     <c:extLst>
       <c:ext xmlns:c16r3="http://schemas.microsoft.com/office/drawing/2017/03/chart" uri="{56B9EC1D-385E-4148-901F-78D8002777C0}">
         <c16r3:dataDisplayOptions16>
@@ -1727,6 +1723,7 @@
         </c16r3:dataDisplayOptions16>
       </c:ext>
     </c:extLst>
+    <c:showDLblsOverMax val="0"/>
   </c:chart>
   <c:spPr>
     <a:noFill/>
@@ -1742,7 +1739,7 @@
       <a:pPr>
         <a:defRPr/>
       </a:pPr>
-      <a:endParaRPr lang="ar-SA"/>
+      <a:endParaRPr lang="en-US"/>
     </a:p>
   </c:txPr>
   <c:externalData r:id="rId3">
@@ -2389,7 +2386,7 @@
           <a:p>
             <a:fld id="{5B041F66-0B57-9A48-9465-56FFF332D349}" type="datetimeFigureOut">
               <a:rPr lang="en-US" smtClean="0"/>
-              <a:t>3/27/2023</a:t>
+              <a:t>3/27/23</a:t>
             </a:fld>
             <a:endParaRPr lang="en-US"/>
           </a:p>
@@ -2897,7 +2894,7 @@
           <a:p>
             <a:fld id="{5E7AA473-D82F-4EFF-9DF7-AE6D83C51288}" type="datetime1">
               <a:rPr lang="en-US" smtClean="0"/>
-              <a:t>3/27/2023</a:t>
+              <a:t>3/27/23</a:t>
             </a:fld>
             <a:endParaRPr lang="en-US"/>
           </a:p>
@@ -2965,7 +2962,7 @@
                 <a16:creationId xmlns:a16="http://schemas.microsoft.com/office/drawing/2014/main" id="{F3FF94B3-6D3E-44FE-BB02-A9027C0003C7}"/>
               </a:ext>
               <a:ext uri="{C183D7F6-B498-43B3-948B-1728B52AA6E4}">
-                <adec:decorative xmlns:adec="http://schemas.microsoft.com/office/drawing/2017/decorative" xmlns="" val="1"/>
+                <adec:decorative xmlns:adec="http://schemas.microsoft.com/office/drawing/2017/decorative" val="1"/>
               </a:ext>
             </a:extLst>
           </p:cNvPr>
@@ -3151,7 +3148,7 @@
           <a:p>
             <a:fld id="{1E12F1F0-FE2D-4C1C-B320-8CB9BE735F0F}" type="datetime1">
               <a:rPr lang="en-US" smtClean="0"/>
-              <a:t>3/27/2023</a:t>
+              <a:t>3/27/23</a:t>
             </a:fld>
             <a:endParaRPr lang="en-US"/>
           </a:p>
@@ -3249,7 +3246,7 @@
                 <a16:creationId xmlns:a16="http://schemas.microsoft.com/office/drawing/2014/main" id="{BD7BD47B-C187-494C-812F-46BE0040B915}"/>
               </a:ext>
               <a:ext uri="{C183D7F6-B498-43B3-948B-1728B52AA6E4}">
-                <adec:decorative xmlns:adec="http://schemas.microsoft.com/office/drawing/2017/decorative" xmlns="" val="1"/>
+                <adec:decorative xmlns:adec="http://schemas.microsoft.com/office/drawing/2017/decorative" val="1"/>
               </a:ext>
             </a:extLst>
           </p:cNvPr>
@@ -3419,7 +3416,7 @@
           <a:p>
             <a:fld id="{2CF1B96C-10FD-4EBC-9029-9652B7535D02}" type="datetime1">
               <a:rPr lang="en-US" smtClean="0"/>
-              <a:t>3/27/2023</a:t>
+              <a:t>3/27/23</a:t>
             </a:fld>
             <a:endParaRPr lang="en-US"/>
           </a:p>
@@ -3487,7 +3484,7 @@
                 <a16:creationId xmlns:a16="http://schemas.microsoft.com/office/drawing/2014/main" id="{4618136A-0796-46EB-89BB-4C73C0258FE9}"/>
               </a:ext>
               <a:ext uri="{C183D7F6-B498-43B3-948B-1728B52AA6E4}">
-                <adec:decorative xmlns:adec="http://schemas.microsoft.com/office/drawing/2017/decorative" xmlns="" val="1"/>
+                <adec:decorative xmlns:adec="http://schemas.microsoft.com/office/drawing/2017/decorative" val="1"/>
               </a:ext>
             </a:extLst>
           </p:cNvPr>
@@ -3673,7 +3670,7 @@
           <a:p>
             <a:fld id="{14878474-CC00-4A95-9D50-A41C12D1EEC4}" type="datetime1">
               <a:rPr lang="en-US" smtClean="0"/>
-              <a:t>3/27/2023</a:t>
+              <a:t>3/27/23</a:t>
             </a:fld>
             <a:endParaRPr lang="en-US"/>
           </a:p>
@@ -3951,7 +3948,7 @@
           <a:p>
             <a:fld id="{7F38C8B4-7FBB-408F-BDB9-F0496874AFB2}" type="datetime1">
               <a:rPr lang="en-US" smtClean="0"/>
-              <a:t>3/27/2023</a:t>
+              <a:t>3/27/23</a:t>
             </a:fld>
             <a:endParaRPr lang="en-US"/>
           </a:p>
@@ -4223,7 +4220,7 @@
           <a:p>
             <a:fld id="{2BB8EE20-A5E2-47D3-8F6D-A2BA7AB2E093}" type="datetime1">
               <a:rPr lang="en-US" smtClean="0"/>
-              <a:t>3/27/2023</a:t>
+              <a:t>3/27/23</a:t>
             </a:fld>
             <a:endParaRPr lang="en-US"/>
           </a:p>
@@ -4321,7 +4318,7 @@
                 <a16:creationId xmlns:a16="http://schemas.microsoft.com/office/drawing/2014/main" id="{BF4AA536-072F-4374-926E-17E038EC7E98}"/>
               </a:ext>
               <a:ext uri="{C183D7F6-B498-43B3-948B-1728B52AA6E4}">
-                <adec:decorative xmlns:adec="http://schemas.microsoft.com/office/drawing/2017/decorative" xmlns="" val="1"/>
+                <adec:decorative xmlns:adec="http://schemas.microsoft.com/office/drawing/2017/decorative" val="1"/>
               </a:ext>
             </a:extLst>
           </p:cNvPr>
@@ -4781,7 +4778,7 @@
           <a:p>
             <a:fld id="{3382CF99-132F-413F-B7EF-71A5C33F2ED6}" type="datetime1">
               <a:rPr lang="en-US" smtClean="0"/>
-              <a:t>3/27/2023</a:t>
+              <a:t>3/27/23</a:t>
             </a:fld>
             <a:endParaRPr lang="en-US"/>
           </a:p>
@@ -4923,7 +4920,7 @@
           <a:p>
             <a:fld id="{1F17AE06-98E0-4D9F-A059-92C3548821BB}" type="datetime1">
               <a:rPr lang="en-US" smtClean="0"/>
-              <a:t>3/27/2023</a:t>
+              <a:t>3/27/23</a:t>
             </a:fld>
             <a:endParaRPr lang="en-US"/>
           </a:p>
@@ -5036,7 +5033,7 @@
           <a:p>
             <a:fld id="{FFBA00CA-3DDC-4705-B840-978EF5EA0707}" type="datetime1">
               <a:rPr lang="en-US" smtClean="0"/>
-              <a:t>3/27/2023</a:t>
+              <a:t>3/27/23</a:t>
             </a:fld>
             <a:endParaRPr lang="en-US"/>
           </a:p>
@@ -5355,7 +5352,7 @@
           <a:p>
             <a:fld id="{FC366D49-0BBA-4C5A-AD96-6448CA63451A}" type="datetime1">
               <a:rPr lang="en-US" smtClean="0"/>
-              <a:t>3/27/2023</a:t>
+              <a:t>3/27/23</a:t>
             </a:fld>
             <a:endParaRPr lang="en-US"/>
           </a:p>
@@ -5652,7 +5649,7 @@
           <a:p>
             <a:fld id="{4F4EB293-A316-472D-A8B4-6947CF1A12B7}" type="datetime1">
               <a:rPr lang="en-US" smtClean="0"/>
-              <a:t>3/27/2023</a:t>
+              <a:t>3/27/23</a:t>
             </a:fld>
             <a:endParaRPr lang="en-US"/>
           </a:p>
@@ -5931,7 +5928,7 @@
           <a:p>
             <a:fld id="{734BCCD4-CEB1-405B-A443-DD9CBCBEA552}" type="datetime1">
               <a:rPr lang="en-US" smtClean="0"/>
-              <a:t>3/27/2023</a:t>
+              <a:t>3/27/23</a:t>
             </a:fld>
             <a:endParaRPr lang="en-US"/>
           </a:p>
@@ -6414,7 +6411,7 @@
                 <a16:creationId xmlns:a16="http://schemas.microsoft.com/office/drawing/2014/main" id="{956C5C09-0043-4549-B800-2101B70D667D}"/>
               </a:ext>
               <a:ext uri="{C183D7F6-B498-43B3-948B-1728B52AA6E4}">
-                <adec:decorative xmlns:adec="http://schemas.microsoft.com/office/drawing/2017/decorative" xmlns="" val="1"/>
+                <adec:decorative xmlns:adec="http://schemas.microsoft.com/office/drawing/2017/decorative" val="1"/>
               </a:ext>
             </a:extLst>
           </p:cNvPr>
@@ -6474,7 +6471,7 @@
                 <a16:creationId xmlns:a16="http://schemas.microsoft.com/office/drawing/2014/main" id="{B7E2F724-2FB3-4D1D-A730-739B8654C030}"/>
               </a:ext>
               <a:ext uri="{C183D7F6-B498-43B3-948B-1728B52AA6E4}">
-                <adec:decorative xmlns:adec="http://schemas.microsoft.com/office/drawing/2017/decorative" xmlns="" val="1"/>
+                <adec:decorative xmlns:adec="http://schemas.microsoft.com/office/drawing/2017/decorative" val="1"/>
               </a:ext>
             </a:extLst>
           </p:cNvPr>
@@ -6617,18 +6614,6 @@
               </a:rPr>
               <a:t>Approve Prediction of Multisequence Learning </a:t>
             </a:r>
-            <a:r>
-              <a:rPr lang="en-IN" sz="3800" dirty="0">
-                <a:solidFill>
-                  <a:srgbClr val="FFFFFF"/>
-                </a:solidFill>
-                <a:effectLst/>
-                <a:latin typeface="Segoe UI" panose="020B0502040204020203" pitchFamily="34" charset="0"/>
-                <a:ea typeface="Yu Gothic Light" panose="020B0300000000000000" pitchFamily="34" charset="-128"/>
-                <a:cs typeface="Times New Roman" panose="02020603050405020304" pitchFamily="18" charset="0"/>
-              </a:rPr>
-              <a:t/>
-            </a:r>
             <a:br>
               <a:rPr lang="en-IN" sz="3800" dirty="0">
                 <a:solidFill>
@@ -6765,7 +6750,7 @@
                 <a16:creationId xmlns:a16="http://schemas.microsoft.com/office/drawing/2014/main" id="{B2C335F7-F61C-4EB4-80F2-4B1438FE66BB}"/>
               </a:ext>
               <a:ext uri="{C183D7F6-B498-43B3-948B-1728B52AA6E4}">
-                <adec:decorative xmlns:adec="http://schemas.microsoft.com/office/drawing/2017/decorative" xmlns="" val="1"/>
+                <adec:decorative xmlns:adec="http://schemas.microsoft.com/office/drawing/2017/decorative" val="1"/>
               </a:ext>
             </a:extLst>
           </p:cNvPr>
@@ -6896,7 +6881,7 @@
                 <a16:creationId xmlns:a16="http://schemas.microsoft.com/office/drawing/2014/main" id="{FAA3B297-9683-4E38-89FA-062C53E13F85}"/>
               </a:ext>
               <a:ext uri="{C183D7F6-B498-43B3-948B-1728B52AA6E4}">
-                <adec:decorative xmlns:adec="http://schemas.microsoft.com/office/drawing/2017/decorative" xmlns="" val="1"/>
+                <adec:decorative xmlns:adec="http://schemas.microsoft.com/office/drawing/2017/decorative" val="1"/>
               </a:ext>
             </a:extLst>
           </p:cNvPr>
@@ -6998,7 +6983,7 @@
                 <a16:creationId xmlns:a16="http://schemas.microsoft.com/office/drawing/2014/main" id="{5B8D7907-8AB9-4E98-A576-1A13AECEDF3A}"/>
               </a:ext>
               <a:ext uri="{C183D7F6-B498-43B3-948B-1728B52AA6E4}">
-                <adec:decorative xmlns:adec="http://schemas.microsoft.com/office/drawing/2017/decorative" xmlns="" val="1"/>
+                <adec:decorative xmlns:adec="http://schemas.microsoft.com/office/drawing/2017/decorative" val="1"/>
               </a:ext>
             </a:extLst>
           </p:cNvPr>
@@ -7176,7 +7161,7 @@
                 <a16:creationId xmlns:a16="http://schemas.microsoft.com/office/drawing/2014/main" id="{FAA3B297-9683-4E38-89FA-062C53E13F85}"/>
               </a:ext>
               <a:ext uri="{C183D7F6-B498-43B3-948B-1728B52AA6E4}">
-                <adec:decorative xmlns:adec="http://schemas.microsoft.com/office/drawing/2017/decorative" xmlns="" val="1"/>
+                <adec:decorative xmlns:adec="http://schemas.microsoft.com/office/drawing/2017/decorative" val="1"/>
               </a:ext>
             </a:extLst>
           </p:cNvPr>
@@ -7274,7 +7259,7 @@
                 <a16:creationId xmlns:a16="http://schemas.microsoft.com/office/drawing/2014/main" id="{5B8D7907-8AB9-4E98-A576-1A13AECEDF3A}"/>
               </a:ext>
               <a:ext uri="{C183D7F6-B498-43B3-948B-1728B52AA6E4}">
-                <adec:decorative xmlns:adec="http://schemas.microsoft.com/office/drawing/2017/decorative" xmlns="" val="1"/>
+                <adec:decorative xmlns:adec="http://schemas.microsoft.com/office/drawing/2017/decorative" val="1"/>
               </a:ext>
             </a:extLst>
           </p:cNvPr>
@@ -8145,7 +8130,7 @@
                 <a16:creationId xmlns:a16="http://schemas.microsoft.com/office/drawing/2014/main" id="{FAA3B297-9683-4E38-89FA-062C53E13F85}"/>
               </a:ext>
               <a:ext uri="{C183D7F6-B498-43B3-948B-1728B52AA6E4}">
-                <adec:decorative xmlns:adec="http://schemas.microsoft.com/office/drawing/2017/decorative" xmlns="" val="1"/>
+                <adec:decorative xmlns:adec="http://schemas.microsoft.com/office/drawing/2017/decorative" val="1"/>
               </a:ext>
             </a:extLst>
           </p:cNvPr>
@@ -8240,7 +8225,7 @@
                 <a16:creationId xmlns:a16="http://schemas.microsoft.com/office/drawing/2014/main" id="{5B8D7907-8AB9-4E98-A576-1A13AECEDF3A}"/>
               </a:ext>
               <a:ext uri="{C183D7F6-B498-43B3-948B-1728B52AA6E4}">
-                <adec:decorative xmlns:adec="http://schemas.microsoft.com/office/drawing/2017/decorative" xmlns="" val="1"/>
+                <adec:decorative xmlns:adec="http://schemas.microsoft.com/office/drawing/2017/decorative" val="1"/>
               </a:ext>
             </a:extLst>
           </p:cNvPr>
@@ -8327,25 +8312,7 @@
               <a:rPr lang="en-IN" dirty="0">
                 <a:latin typeface="Helvetica Neue"/>
               </a:rPr>
-              <a:t>From all the experiments carried out in the training phase and prediction phase, the similarities between sequences of the same class different classes have explained our findings </a:t>
-            </a:r>
-            <a:r>
-              <a:rPr lang="en-IN" dirty="0" smtClean="0">
-                <a:latin typeface="Helvetica Neue"/>
-              </a:rPr>
-              <a:t>in </a:t>
-            </a:r>
-            <a:r>
-              <a:rPr lang="en-IN" dirty="0">
-                <a:latin typeface="Helvetica Neue"/>
-              </a:rPr>
-              <a:t>the below-given </a:t>
-            </a:r>
-            <a:r>
-              <a:rPr lang="en-IN" dirty="0" smtClean="0">
-                <a:latin typeface="Helvetica Neue"/>
-              </a:rPr>
-              <a:t>cases</a:t>
+              <a:t>From all the experiments carried out in the training phase and prediction phase, the similarities between sequences of the same class different classes have explained our findings in the below-given cases</a:t>
             </a:r>
           </a:p>
           <a:p>
@@ -8359,7 +8326,7 @@
             </a:r>
           </a:p>
           <a:p>
-            <a:endParaRPr lang="en-IN" dirty="0" smtClean="0">
+            <a:endParaRPr lang="en-IN" dirty="0">
               <a:latin typeface="Helvetica Neue"/>
             </a:endParaRPr>
           </a:p>
@@ -8446,7 +8413,7 @@
                 <a16:creationId xmlns:a16="http://schemas.microsoft.com/office/drawing/2014/main" id="{FAA3B297-9683-4E38-89FA-062C53E13F85}"/>
               </a:ext>
               <a:ext uri="{C183D7F6-B498-43B3-948B-1728B52AA6E4}">
-                <adec:decorative xmlns:adec="http://schemas.microsoft.com/office/drawing/2017/decorative" xmlns="" val="1"/>
+                <adec:decorative xmlns:adec="http://schemas.microsoft.com/office/drawing/2017/decorative" val="1"/>
               </a:ext>
             </a:extLst>
           </p:cNvPr>
@@ -8541,7 +8508,7 @@
                 <a16:creationId xmlns:a16="http://schemas.microsoft.com/office/drawing/2014/main" id="{5B8D7907-8AB9-4E98-A576-1A13AECEDF3A}"/>
               </a:ext>
               <a:ext uri="{C183D7F6-B498-43B3-948B-1728B52AA6E4}">
-                <adec:decorative xmlns:adec="http://schemas.microsoft.com/office/drawing/2017/decorative" xmlns="" val="1"/>
+                <adec:decorative xmlns:adec="http://schemas.microsoft.com/office/drawing/2017/decorative" val="1"/>
               </a:ext>
             </a:extLst>
           </p:cNvPr>
@@ -8653,6 +8620,395 @@
 </file>
 
 <file path=ppt/slides/slide14.xml><?xml version="1.0" encoding="utf-8"?>
+<p:sld xmlns:a="http://schemas.openxmlformats.org/drawingml/2006/main" xmlns:r="http://schemas.openxmlformats.org/officeDocument/2006/relationships" xmlns:p="http://schemas.openxmlformats.org/presentationml/2006/main">
+  <p:cSld>
+    <p:bg>
+      <p:bgPr>
+        <a:solidFill>
+          <a:schemeClr val="bg1"/>
+        </a:solidFill>
+        <a:effectLst/>
+      </p:bgPr>
+    </p:bg>
+    <p:spTree>
+      <p:nvGrpSpPr>
+        <p:cNvPr id="1" name=""/>
+        <p:cNvGrpSpPr/>
+        <p:nvPr/>
+      </p:nvGrpSpPr>
+      <p:grpSpPr>
+        <a:xfrm>
+          <a:off x="0" y="0"/>
+          <a:ext cx="0" cy="0"/>
+          <a:chOff x="0" y="0"/>
+          <a:chExt cx="0" cy="0"/>
+        </a:xfrm>
+      </p:grpSpPr>
+      <p:sp useBgFill="1">
+        <p:nvSpPr>
+          <p:cNvPr id="8" name="Rectangle 7">
+            <a:extLst>
+              <a:ext uri="{FF2B5EF4-FFF2-40B4-BE49-F238E27FC236}">
+                <a16:creationId xmlns:a16="http://schemas.microsoft.com/office/drawing/2014/main" id="{FAA3B297-9683-4E38-89FA-062C53E13F85}"/>
+              </a:ext>
+              <a:ext uri="{C183D7F6-B498-43B3-948B-1728B52AA6E4}">
+                <adec:decorative xmlns:adec="http://schemas.microsoft.com/office/drawing/2017/decorative" val="1"/>
+              </a:ext>
+            </a:extLst>
+          </p:cNvPr>
+          <p:cNvSpPr>
+            <a:spLocks noGrp="1" noRot="1" noChangeAspect="1" noMove="1" noResize="1" noEditPoints="1" noAdjustHandles="1" noChangeArrowheads="1" noChangeShapeType="1" noTextEdit="1"/>
+          </p:cNvSpPr>
+          <p:nvPr>
+            <p:extLst>
+              <p:ext uri="{386F3935-93C4-4BCD-93E2-E3B085C9AB24}">
+                <p16:designElem xmlns:p16="http://schemas.microsoft.com/office/powerpoint/2015/main" val="1"/>
+              </p:ext>
+            </p:extLst>
+          </p:nvPr>
+        </p:nvSpPr>
+        <p:spPr>
+          <a:xfrm>
+            <a:off x="0" y="0"/>
+            <a:ext cx="12188952" cy="6857995"/>
+          </a:xfrm>
+          <a:prstGeom prst="rect">
+            <a:avLst/>
+          </a:prstGeom>
+          <a:ln>
+            <a:noFill/>
+          </a:ln>
+        </p:spPr>
+        <p:style>
+          <a:lnRef idx="2">
+            <a:schemeClr val="accent1">
+              <a:shade val="50000"/>
+            </a:schemeClr>
+          </a:lnRef>
+          <a:fillRef idx="1">
+            <a:schemeClr val="accent1"/>
+          </a:fillRef>
+          <a:effectRef idx="0">
+            <a:schemeClr val="accent1"/>
+          </a:effectRef>
+          <a:fontRef idx="minor">
+            <a:schemeClr val="lt1"/>
+          </a:fontRef>
+        </p:style>
+        <p:txBody>
+          <a:bodyPr rtlCol="0" anchor="ctr"/>
+          <a:lstStyle/>
+          <a:p>
+            <a:pPr algn="ctr"/>
+            <a:endParaRPr lang="en-US" dirty="0"/>
+          </a:p>
+        </p:txBody>
+      </p:sp>
+      <p:sp>
+        <p:nvSpPr>
+          <p:cNvPr id="2" name="Title 1">
+            <a:extLst>
+              <a:ext uri="{FF2B5EF4-FFF2-40B4-BE49-F238E27FC236}">
+                <a16:creationId xmlns:a16="http://schemas.microsoft.com/office/drawing/2014/main" id="{D73406E1-F2BE-59D9-A9F1-8140C3C0F06B}"/>
+              </a:ext>
+            </a:extLst>
+          </p:cNvPr>
+          <p:cNvSpPr>
+            <a:spLocks noGrp="1"/>
+          </p:cNvSpPr>
+          <p:nvPr>
+            <p:ph type="title"/>
+          </p:nvPr>
+        </p:nvSpPr>
+        <p:spPr>
+          <a:xfrm>
+            <a:off x="517869" y="976160"/>
+            <a:ext cx="8686800" cy="926781"/>
+          </a:xfrm>
+        </p:spPr>
+        <p:txBody>
+          <a:bodyPr>
+            <a:normAutofit/>
+          </a:bodyPr>
+          <a:lstStyle/>
+          <a:p>
+            <a:r>
+              <a:rPr lang="en-US" dirty="0"/>
+              <a:t>References:</a:t>
+            </a:r>
+          </a:p>
+        </p:txBody>
+      </p:sp>
+      <p:sp>
+        <p:nvSpPr>
+          <p:cNvPr id="10" name="Rectangle 9">
+            <a:extLst>
+              <a:ext uri="{FF2B5EF4-FFF2-40B4-BE49-F238E27FC236}">
+                <a16:creationId xmlns:a16="http://schemas.microsoft.com/office/drawing/2014/main" id="{5B8D7907-8AB9-4E98-A576-1A13AECEDF3A}"/>
+              </a:ext>
+              <a:ext uri="{C183D7F6-B498-43B3-948B-1728B52AA6E4}">
+                <adec:decorative xmlns:adec="http://schemas.microsoft.com/office/drawing/2017/decorative" val="1"/>
+              </a:ext>
+            </a:extLst>
+          </p:cNvPr>
+          <p:cNvSpPr>
+            <a:spLocks noGrp="1" noRot="1" noChangeAspect="1" noMove="1" noResize="1" noEditPoints="1" noAdjustHandles="1" noChangeArrowheads="1" noChangeShapeType="1" noTextEdit="1"/>
+          </p:cNvSpPr>
+          <p:nvPr>
+            <p:extLst>
+              <p:ext uri="{386F3935-93C4-4BCD-93E2-E3B085C9AB24}">
+                <p16:designElem xmlns:p16="http://schemas.microsoft.com/office/powerpoint/2015/main" val="1"/>
+              </p:ext>
+            </p:extLst>
+          </p:nvPr>
+        </p:nvSpPr>
+        <p:spPr>
+          <a:xfrm>
+            <a:off x="517869" y="508090"/>
+            <a:ext cx="8732520" cy="149279"/>
+          </a:xfrm>
+          <a:prstGeom prst="rect">
+            <a:avLst/>
+          </a:prstGeom>
+          <a:solidFill>
+            <a:schemeClr val="tx1"/>
+          </a:solidFill>
+          <a:ln>
+            <a:noFill/>
+          </a:ln>
+        </p:spPr>
+        <p:style>
+          <a:lnRef idx="2">
+            <a:schemeClr val="accent1">
+              <a:shade val="50000"/>
+            </a:schemeClr>
+          </a:lnRef>
+          <a:fillRef idx="1">
+            <a:schemeClr val="accent1"/>
+          </a:fillRef>
+          <a:effectRef idx="0">
+            <a:schemeClr val="accent1"/>
+          </a:effectRef>
+          <a:fontRef idx="minor">
+            <a:schemeClr val="lt1"/>
+          </a:fontRef>
+        </p:style>
+        <p:txBody>
+          <a:bodyPr rtlCol="0" anchor="ctr"/>
+          <a:lstStyle/>
+          <a:p>
+            <a:pPr algn="ctr"/>
+            <a:endParaRPr lang="en-US"/>
+          </a:p>
+        </p:txBody>
+      </p:sp>
+      <p:sp>
+        <p:nvSpPr>
+          <p:cNvPr id="3" name="Content Placeholder 2">
+            <a:extLst>
+              <a:ext uri="{FF2B5EF4-FFF2-40B4-BE49-F238E27FC236}">
+                <a16:creationId xmlns:a16="http://schemas.microsoft.com/office/drawing/2014/main" id="{CF6AF3CE-9383-CE1A-B92E-C7C0DC00B4DD}"/>
+              </a:ext>
+            </a:extLst>
+          </p:cNvPr>
+          <p:cNvSpPr>
+            <a:spLocks noGrp="1"/>
+          </p:cNvSpPr>
+          <p:nvPr>
+            <p:ph idx="1"/>
+          </p:nvPr>
+        </p:nvSpPr>
+        <p:spPr>
+          <a:xfrm>
+            <a:off x="517869" y="2323070"/>
+            <a:ext cx="8686799" cy="3865794"/>
+          </a:xfrm>
+        </p:spPr>
+        <p:txBody>
+          <a:bodyPr>
+            <a:normAutofit/>
+          </a:bodyPr>
+          <a:lstStyle/>
+          <a:p>
+            <a:r>
+              <a:rPr lang="en-US" dirty="0">
+                <a:latin typeface="Arial" panose="020B0604020202020204" pitchFamily="34" charset="0"/>
+                <a:cs typeface="Arial" panose="020B0604020202020204" pitchFamily="34" charset="0"/>
+              </a:rPr>
+              <a:t>[1] </a:t>
+            </a:r>
+            <a:r>
+              <a:rPr lang="en-US" dirty="0" err="1">
+                <a:latin typeface="Arial" panose="020B0604020202020204" pitchFamily="34" charset="0"/>
+                <a:cs typeface="Arial" panose="020B0604020202020204" pitchFamily="34" charset="0"/>
+              </a:rPr>
+              <a:t>Keele</a:t>
+            </a:r>
+            <a:r>
+              <a:rPr lang="en-US" dirty="0">
+                <a:latin typeface="Arial" panose="020B0604020202020204" pitchFamily="34" charset="0"/>
+                <a:cs typeface="Arial" panose="020B0604020202020204" pitchFamily="34" charset="0"/>
+              </a:rPr>
+              <a:t>, "“Sequence learning,” - B. A. C. G. J. D. S. W.," 1998. [Online]. Available: </a:t>
+            </a:r>
+            <a:r>
+              <a:rPr lang="en-US" dirty="0">
+                <a:latin typeface="Arial" panose="020B0604020202020204" pitchFamily="34" charset="0"/>
+                <a:cs typeface="Arial" panose="020B0604020202020204" pitchFamily="34" charset="0"/>
+                <a:hlinkClick r:id="rId2"/>
+              </a:rPr>
+              <a:t>https://pubmed.ncbi.nlm.nih.gov/21227209</a:t>
+            </a:r>
+            <a:r>
+              <a:rPr lang="en-US" dirty="0">
+                <a:latin typeface="Arial" panose="020B0604020202020204" pitchFamily="34" charset="0"/>
+                <a:cs typeface="Arial" panose="020B0604020202020204" pitchFamily="34" charset="0"/>
+              </a:rPr>
+              <a:t>..</a:t>
+            </a:r>
+          </a:p>
+          <a:p>
+            <a:r>
+              <a:rPr lang="en-US" dirty="0">
+                <a:latin typeface="Arial" panose="020B0604020202020204" pitchFamily="34" charset="0"/>
+                <a:cs typeface="Arial" panose="020B0604020202020204" pitchFamily="34" charset="0"/>
+              </a:rPr>
+              <a:t>[2] B. H. J. L. R. .</a:t>
+            </a:r>
+            <a:r>
+              <a:rPr lang="en-US" dirty="0" err="1">
+                <a:latin typeface="Arial" panose="020B0604020202020204" pitchFamily="34" charset="0"/>
+                <a:cs typeface="Arial" panose="020B0604020202020204" pitchFamily="34" charset="0"/>
+              </a:rPr>
+              <a:t>Rabiner</a:t>
+            </a:r>
+            <a:r>
+              <a:rPr lang="en-US" dirty="0">
+                <a:latin typeface="Arial" panose="020B0604020202020204" pitchFamily="34" charset="0"/>
+                <a:cs typeface="Arial" panose="020B0604020202020204" pitchFamily="34" charset="0"/>
+              </a:rPr>
+              <a:t>, “An introduction to hidden </a:t>
+            </a:r>
+            <a:r>
+              <a:rPr lang="en-US" dirty="0" err="1">
+                <a:latin typeface="Arial" panose="020B0604020202020204" pitchFamily="34" charset="0"/>
+                <a:cs typeface="Arial" panose="020B0604020202020204" pitchFamily="34" charset="0"/>
+              </a:rPr>
+              <a:t>markov</a:t>
+            </a:r>
+            <a:r>
+              <a:rPr lang="en-US" dirty="0">
+                <a:latin typeface="Arial" panose="020B0604020202020204" pitchFamily="34" charset="0"/>
+                <a:cs typeface="Arial" panose="020B0604020202020204" pitchFamily="34" charset="0"/>
+              </a:rPr>
+              <a:t> models,”," 1986. [Online]. Available: </a:t>
+            </a:r>
+            <a:r>
+              <a:rPr lang="en-US" dirty="0">
+                <a:latin typeface="Arial" panose="020B0604020202020204" pitchFamily="34" charset="0"/>
+                <a:cs typeface="Arial" panose="020B0604020202020204" pitchFamily="34" charset="0"/>
+                <a:hlinkClick r:id="rId3"/>
+              </a:rPr>
+              <a:t>http://ai.stanford.edu/~pabbeel/depth_qual/Rabiner_Juang_hmms.pdf</a:t>
+            </a:r>
+            <a:r>
+              <a:rPr lang="en-US" dirty="0">
+                <a:latin typeface="Arial" panose="020B0604020202020204" pitchFamily="34" charset="0"/>
+                <a:cs typeface="Arial" panose="020B0604020202020204" pitchFamily="34" charset="0"/>
+              </a:rPr>
+              <a:t>.</a:t>
+            </a:r>
+          </a:p>
+          <a:p>
+            <a:r>
+              <a:rPr lang="en-US" dirty="0">
+                <a:latin typeface="Arial" panose="020B0604020202020204" pitchFamily="34" charset="0"/>
+                <a:cs typeface="Arial" panose="020B0604020202020204" pitchFamily="34" charset="0"/>
+              </a:rPr>
+              <a:t>[3]</a:t>
+            </a:r>
+            <a:r>
+              <a:rPr lang="en-IN" b="1" i="0" u="none" strike="noStrike" dirty="0">
+                <a:effectLst/>
+                <a:latin typeface="Roboto" panose="02000000000000000000" pitchFamily="2" charset="0"/>
+                <a:hlinkClick r:id="rId4"/>
+              </a:rPr>
+              <a:t> Yudhi Adhitya</a:t>
+            </a:r>
+            <a:r>
+              <a:rPr lang="en-US" dirty="0">
+                <a:latin typeface="Arial" panose="020B0604020202020204" pitchFamily="34" charset="0"/>
+                <a:cs typeface="Arial" panose="020B0604020202020204" pitchFamily="34" charset="0"/>
+              </a:rPr>
+              <a:t>,”</a:t>
+            </a:r>
+            <a:r>
+              <a:rPr lang="en-IN" b="0" i="0" dirty="0">
+                <a:solidFill>
+                  <a:srgbClr val="111111"/>
+                </a:solidFill>
+                <a:effectLst/>
+                <a:latin typeface="Roboto" panose="020F0502020204030204" pitchFamily="34" charset="0"/>
+              </a:rPr>
+              <a:t> IoT and Deep Learning-Based Farmer Safety System”</a:t>
+            </a:r>
+          </a:p>
+          <a:p>
+            <a:r>
+              <a:rPr lang="en-US" dirty="0">
+                <a:latin typeface="Arial" panose="020B0604020202020204" pitchFamily="34" charset="0"/>
+                <a:cs typeface="Arial" panose="020B0604020202020204" pitchFamily="34" charset="0"/>
+              </a:rPr>
+              <a:t>2023 .[Online].</a:t>
+            </a:r>
+            <a:r>
+              <a:rPr lang="en-US" dirty="0" err="1">
+                <a:latin typeface="Arial" panose="020B0604020202020204" pitchFamily="34" charset="0"/>
+                <a:cs typeface="Arial" panose="020B0604020202020204" pitchFamily="34" charset="0"/>
+              </a:rPr>
+              <a:t>Available:https</a:t>
+            </a:r>
+            <a:r>
+              <a:rPr lang="en-US" dirty="0">
+                <a:latin typeface="Arial" panose="020B0604020202020204" pitchFamily="34" charset="0"/>
+                <a:cs typeface="Arial" panose="020B0604020202020204" pitchFamily="34" charset="0"/>
+              </a:rPr>
+              <a:t>://</a:t>
+            </a:r>
+            <a:r>
+              <a:rPr lang="en-US" dirty="0" err="1">
+                <a:latin typeface="Arial" panose="020B0604020202020204" pitchFamily="34" charset="0"/>
+                <a:cs typeface="Arial" panose="020B0604020202020204" pitchFamily="34" charset="0"/>
+              </a:rPr>
+              <a:t>www.researchgate.net</a:t>
+            </a:r>
+            <a:r>
+              <a:rPr lang="en-US" dirty="0">
+                <a:latin typeface="Arial" panose="020B0604020202020204" pitchFamily="34" charset="0"/>
+                <a:cs typeface="Arial" panose="020B0604020202020204" pitchFamily="34" charset="0"/>
+              </a:rPr>
+              <a:t>/figure/Hierarchical-Temporal-Memory-HTM-algorithm-flowchart_fig2_369126441</a:t>
+            </a:r>
+          </a:p>
+          <a:p>
+            <a:endParaRPr lang="en-US" dirty="0"/>
+          </a:p>
+        </p:txBody>
+      </p:sp>
+    </p:spTree>
+    <p:extLst>
+      <p:ext uri="{BB962C8B-B14F-4D97-AF65-F5344CB8AC3E}">
+        <p14:creationId xmlns:p14="http://schemas.microsoft.com/office/powerpoint/2010/main" val="3087154857"/>
+      </p:ext>
+    </p:extLst>
+  </p:cSld>
+  <p:clrMapOvr>
+    <a:masterClrMapping/>
+  </p:clrMapOvr>
+</p:sld>
+</file>
+
+<file path=ppt/slides/slide15.xml><?xml version="1.0" encoding="utf-8"?>
 <p:sld xmlns:a="http://schemas.openxmlformats.org/drawingml/2006/main" xmlns:r="http://schemas.openxmlformats.org/officeDocument/2006/relationships" xmlns:p="http://schemas.openxmlformats.org/presentationml/2006/main">
   <p:cSld>
     <p:spTree>
@@ -8764,7 +9120,7 @@
                 <a16:creationId xmlns:a16="http://schemas.microsoft.com/office/drawing/2014/main" id="{FAA3B297-9683-4E38-89FA-062C53E13F85}"/>
               </a:ext>
               <a:ext uri="{C183D7F6-B498-43B3-948B-1728B52AA6E4}">
-                <adec:decorative xmlns:adec="http://schemas.microsoft.com/office/drawing/2017/decorative" xmlns="" val="1"/>
+                <adec:decorative xmlns:adec="http://schemas.microsoft.com/office/drawing/2017/decorative" val="1"/>
               </a:ext>
             </a:extLst>
           </p:cNvPr>
@@ -8862,7 +9218,7 @@
                 <a16:creationId xmlns:a16="http://schemas.microsoft.com/office/drawing/2014/main" id="{5B8D7907-8AB9-4E98-A576-1A13AECEDF3A}"/>
               </a:ext>
               <a:ext uri="{C183D7F6-B498-43B3-948B-1728B52AA6E4}">
-                <adec:decorative xmlns:adec="http://schemas.microsoft.com/office/drawing/2017/decorative" xmlns="" val="1"/>
+                <adec:decorative xmlns:adec="http://schemas.microsoft.com/office/drawing/2017/decorative" val="1"/>
               </a:ext>
             </a:extLst>
           </p:cNvPr>
@@ -9040,7 +9396,7 @@
                 <a16:creationId xmlns:a16="http://schemas.microsoft.com/office/drawing/2014/main" id="{FAA3B297-9683-4E38-89FA-062C53E13F85}"/>
               </a:ext>
               <a:ext uri="{C183D7F6-B498-43B3-948B-1728B52AA6E4}">
-                <adec:decorative xmlns:adec="http://schemas.microsoft.com/office/drawing/2017/decorative" xmlns="" val="1"/>
+                <adec:decorative xmlns:adec="http://schemas.microsoft.com/office/drawing/2017/decorative" val="1"/>
               </a:ext>
             </a:extLst>
           </p:cNvPr>
@@ -9135,7 +9491,7 @@
                 <a16:creationId xmlns:a16="http://schemas.microsoft.com/office/drawing/2014/main" id="{5B8D7907-8AB9-4E98-A576-1A13AECEDF3A}"/>
               </a:ext>
               <a:ext uri="{C183D7F6-B498-43B3-948B-1728B52AA6E4}">
-                <adec:decorative xmlns:adec="http://schemas.microsoft.com/office/drawing/2017/decorative" xmlns="" val="1"/>
+                <adec:decorative xmlns:adec="http://schemas.microsoft.com/office/drawing/2017/decorative" val="1"/>
               </a:ext>
             </a:extLst>
           </p:cNvPr>
@@ -9330,7 +9686,7 @@
                 <a16:creationId xmlns:a16="http://schemas.microsoft.com/office/drawing/2014/main" id="{FAA3B297-9683-4E38-89FA-062C53E13F85}"/>
               </a:ext>
               <a:ext uri="{C183D7F6-B498-43B3-948B-1728B52AA6E4}">
-                <adec:decorative xmlns:adec="http://schemas.microsoft.com/office/drawing/2017/decorative" xmlns="" val="1"/>
+                <adec:decorative xmlns:adec="http://schemas.microsoft.com/office/drawing/2017/decorative" val="1"/>
               </a:ext>
             </a:extLst>
           </p:cNvPr>
@@ -9425,7 +9781,7 @@
                 <a16:creationId xmlns:a16="http://schemas.microsoft.com/office/drawing/2014/main" id="{5B8D7907-8AB9-4E98-A576-1A13AECEDF3A}"/>
               </a:ext>
               <a:ext uri="{C183D7F6-B498-43B3-948B-1728B52AA6E4}">
-                <adec:decorative xmlns:adec="http://schemas.microsoft.com/office/drawing/2017/decorative" xmlns="" val="1"/>
+                <adec:decorative xmlns:adec="http://schemas.microsoft.com/office/drawing/2017/decorative" val="1"/>
               </a:ext>
             </a:extLst>
           </p:cNvPr>
@@ -9621,7 +9977,7 @@
                 <a16:creationId xmlns:a16="http://schemas.microsoft.com/office/drawing/2014/main" id="{FAA3B297-9683-4E38-89FA-062C53E13F85}"/>
               </a:ext>
               <a:ext uri="{C183D7F6-B498-43B3-948B-1728B52AA6E4}">
-                <adec:decorative xmlns:adec="http://schemas.microsoft.com/office/drawing/2017/decorative" xmlns="" val="1"/>
+                <adec:decorative xmlns:adec="http://schemas.microsoft.com/office/drawing/2017/decorative" val="1"/>
               </a:ext>
             </a:extLst>
           </p:cNvPr>
@@ -9724,7 +10080,7 @@
                 <a16:creationId xmlns:a16="http://schemas.microsoft.com/office/drawing/2014/main" id="{5B8D7907-8AB9-4E98-A576-1A13AECEDF3A}"/>
               </a:ext>
               <a:ext uri="{C183D7F6-B498-43B3-948B-1728B52AA6E4}">
-                <adec:decorative xmlns:adec="http://schemas.microsoft.com/office/drawing/2017/decorative" xmlns="" val="1"/>
+                <adec:decorative xmlns:adec="http://schemas.microsoft.com/office/drawing/2017/decorative" val="1"/>
               </a:ext>
             </a:extLst>
           </p:cNvPr>
@@ -9903,7 +10259,7 @@
                 <a16:creationId xmlns:a16="http://schemas.microsoft.com/office/drawing/2014/main" id="{FAA3B297-9683-4E38-89FA-062C53E13F85}"/>
               </a:ext>
               <a:ext uri="{C183D7F6-B498-43B3-948B-1728B52AA6E4}">
-                <adec:decorative xmlns:adec="http://schemas.microsoft.com/office/drawing/2017/decorative" xmlns="" val="1"/>
+                <adec:decorative xmlns:adec="http://schemas.microsoft.com/office/drawing/2017/decorative" val="1"/>
               </a:ext>
             </a:extLst>
           </p:cNvPr>
@@ -9998,7 +10354,7 @@
                 <a16:creationId xmlns:a16="http://schemas.microsoft.com/office/drawing/2014/main" id="{5B8D7907-8AB9-4E98-A576-1A13AECEDF3A}"/>
               </a:ext>
               <a:ext uri="{C183D7F6-B498-43B3-948B-1728B52AA6E4}">
-                <adec:decorative xmlns:adec="http://schemas.microsoft.com/office/drawing/2017/decorative" xmlns="" val="1"/>
+                <adec:decorative xmlns:adec="http://schemas.microsoft.com/office/drawing/2017/decorative" val="1"/>
               </a:ext>
             </a:extLst>
           </p:cNvPr>
@@ -10820,7 +11176,7 @@
                 <a16:creationId xmlns:a16="http://schemas.microsoft.com/office/drawing/2014/main" id="{FAA3B297-9683-4E38-89FA-062C53E13F85}"/>
               </a:ext>
               <a:ext uri="{C183D7F6-B498-43B3-948B-1728B52AA6E4}">
-                <adec:decorative xmlns:adec="http://schemas.microsoft.com/office/drawing/2017/decorative" xmlns="" val="1"/>
+                <adec:decorative xmlns:adec="http://schemas.microsoft.com/office/drawing/2017/decorative" val="1"/>
               </a:ext>
             </a:extLst>
           </p:cNvPr>
@@ -10915,7 +11271,7 @@
                 <a16:creationId xmlns:a16="http://schemas.microsoft.com/office/drawing/2014/main" id="{5B8D7907-8AB9-4E98-A576-1A13AECEDF3A}"/>
               </a:ext>
               <a:ext uri="{C183D7F6-B498-43B3-948B-1728B52AA6E4}">
-                <adec:decorative xmlns:adec="http://schemas.microsoft.com/office/drawing/2017/decorative" xmlns="" val="1"/>
+                <adec:decorative xmlns:adec="http://schemas.microsoft.com/office/drawing/2017/decorative" val="1"/>
               </a:ext>
             </a:extLst>
           </p:cNvPr>
@@ -11094,7 +11450,7 @@
                 <a16:creationId xmlns:a16="http://schemas.microsoft.com/office/drawing/2014/main" id="{FAA3B297-9683-4E38-89FA-062C53E13F85}"/>
               </a:ext>
               <a:ext uri="{C183D7F6-B498-43B3-948B-1728B52AA6E4}">
-                <adec:decorative xmlns:adec="http://schemas.microsoft.com/office/drawing/2017/decorative" xmlns="" val="1"/>
+                <adec:decorative xmlns:adec="http://schemas.microsoft.com/office/drawing/2017/decorative" val="1"/>
               </a:ext>
             </a:extLst>
           </p:cNvPr>
@@ -11189,7 +11545,7 @@
                 <a16:creationId xmlns:a16="http://schemas.microsoft.com/office/drawing/2014/main" id="{5B8D7907-8AB9-4E98-A576-1A13AECEDF3A}"/>
               </a:ext>
               <a:ext uri="{C183D7F6-B498-43B3-948B-1728B52AA6E4}">
-                <adec:decorative xmlns:adec="http://schemas.microsoft.com/office/drawing/2017/decorative" xmlns="" val="1"/>
+                <adec:decorative xmlns:adec="http://schemas.microsoft.com/office/drawing/2017/decorative" val="1"/>
               </a:ext>
             </a:extLst>
           </p:cNvPr>
@@ -11368,7 +11724,7 @@
                 <a16:creationId xmlns:a16="http://schemas.microsoft.com/office/drawing/2014/main" id="{FAA3B297-9683-4E38-89FA-062C53E13F85}"/>
               </a:ext>
               <a:ext uri="{C183D7F6-B498-43B3-948B-1728B52AA6E4}">
-                <adec:decorative xmlns:adec="http://schemas.microsoft.com/office/drawing/2017/decorative" xmlns="" val="1"/>
+                <adec:decorative xmlns:adec="http://schemas.microsoft.com/office/drawing/2017/decorative" val="1"/>
               </a:ext>
             </a:extLst>
           </p:cNvPr>
@@ -11463,7 +11819,7 @@
                 <a16:creationId xmlns:a16="http://schemas.microsoft.com/office/drawing/2014/main" id="{5B8D7907-8AB9-4E98-A576-1A13AECEDF3A}"/>
               </a:ext>
               <a:ext uri="{C183D7F6-B498-43B3-948B-1728B52AA6E4}">
-                <adec:decorative xmlns:adec="http://schemas.microsoft.com/office/drawing/2017/decorative" xmlns="" val="1"/>
+                <adec:decorative xmlns:adec="http://schemas.microsoft.com/office/drawing/2017/decorative" val="1"/>
               </a:ext>
             </a:extLst>
           </p:cNvPr>

</xml_diff>